<commit_message>
passo a passo da introdução do site javascript.com
</commit_message>
<xml_diff>
--- a/javascript-introducao.pptx
+++ b/javascript-introducao.pptx
@@ -5,7 +5,7 @@
     <p:sldMasterId id="2147483648" r:id="rId1"/>
   </p:sldMasterIdLst>
   <p:notesMasterIdLst>
-    <p:notesMasterId r:id="rId14"/>
+    <p:notesMasterId r:id="rId26"/>
   </p:notesMasterIdLst>
   <p:sldIdLst>
     <p:sldId id="256" r:id="rId2"/>
@@ -19,7 +19,19 @@
     <p:sldId id="443" r:id="rId10"/>
     <p:sldId id="445" r:id="rId11"/>
     <p:sldId id="446" r:id="rId12"/>
-    <p:sldId id="392" r:id="rId13"/>
+    <p:sldId id="447" r:id="rId13"/>
+    <p:sldId id="448" r:id="rId14"/>
+    <p:sldId id="449" r:id="rId15"/>
+    <p:sldId id="450" r:id="rId16"/>
+    <p:sldId id="451" r:id="rId17"/>
+    <p:sldId id="452" r:id="rId18"/>
+    <p:sldId id="453" r:id="rId19"/>
+    <p:sldId id="454" r:id="rId20"/>
+    <p:sldId id="455" r:id="rId21"/>
+    <p:sldId id="456" r:id="rId22"/>
+    <p:sldId id="457" r:id="rId23"/>
+    <p:sldId id="458" r:id="rId24"/>
+    <p:sldId id="392" r:id="rId25"/>
   </p:sldIdLst>
   <p:sldSz cx="12192000" cy="6858000"/>
   <p:notesSz cx="6858000" cy="9144000"/>
@@ -208,7 +220,7 @@
           <a:p>
             <a:fld id="{94D3EB41-CF60-4C9F-BD83-AE56FA0945EB}" type="datetimeFigureOut">
               <a:rPr lang="pt-BR" smtClean="0"/>
-              <a:t>28/04/2020</a:t>
+              <a:t>04/05/2020</a:t>
             </a:fld>
             <a:endParaRPr lang="pt-BR"/>
           </a:p>
@@ -771,7 +783,7 @@
           <a:bodyPr/>
           <a:lstStyle/>
           <a:p>
-            <a:endParaRPr lang="pt-BR" dirty="0"/>
+            <a:endParaRPr lang="en-US" dirty="0"/>
           </a:p>
         </p:txBody>
       </p:sp>
@@ -801,7 +813,595 @@
     </p:spTree>
     <p:extLst>
       <p:ext uri="{BB962C8B-B14F-4D97-AF65-F5344CB8AC3E}">
-        <p14:creationId xmlns:p14="http://schemas.microsoft.com/office/powerpoint/2010/main" val="1008064520"/>
+        <p14:creationId xmlns:p14="http://schemas.microsoft.com/office/powerpoint/2010/main" val="3204390341"/>
+      </p:ext>
+    </p:extLst>
+  </p:cSld>
+  <p:clrMapOvr>
+    <a:masterClrMapping/>
+  </p:clrMapOvr>
+</p:notes>
+</file>
+
+<file path=ppt/notesSlides/notesSlide13.xml><?xml version="1.0" encoding="utf-8"?>
+<p:notes xmlns:a="http://schemas.openxmlformats.org/drawingml/2006/main" xmlns:r="http://schemas.openxmlformats.org/officeDocument/2006/relationships" xmlns:p="http://schemas.openxmlformats.org/presentationml/2006/main">
+  <p:cSld>
+    <p:spTree>
+      <p:nvGrpSpPr>
+        <p:cNvPr id="1" name=""/>
+        <p:cNvGrpSpPr/>
+        <p:nvPr/>
+      </p:nvGrpSpPr>
+      <p:grpSpPr>
+        <a:xfrm>
+          <a:off x="0" y="0"/>
+          <a:ext cx="0" cy="0"/>
+          <a:chOff x="0" y="0"/>
+          <a:chExt cx="0" cy="0"/>
+        </a:xfrm>
+      </p:grpSpPr>
+      <p:sp>
+        <p:nvSpPr>
+          <p:cNvPr id="2" name="Slide Image Placeholder 1"/>
+          <p:cNvSpPr>
+            <a:spLocks noGrp="1" noRot="1" noChangeAspect="1"/>
+          </p:cNvSpPr>
+          <p:nvPr>
+            <p:ph type="sldImg"/>
+          </p:nvPr>
+        </p:nvSpPr>
+        <p:spPr/>
+      </p:sp>
+      <p:sp>
+        <p:nvSpPr>
+          <p:cNvPr id="3" name="Notes Placeholder 2"/>
+          <p:cNvSpPr>
+            <a:spLocks noGrp="1"/>
+          </p:cNvSpPr>
+          <p:nvPr>
+            <p:ph type="body" idx="1"/>
+          </p:nvPr>
+        </p:nvSpPr>
+        <p:spPr/>
+        <p:txBody>
+          <a:bodyPr/>
+          <a:lstStyle/>
+          <a:p>
+            <a:endParaRPr lang="en-US" dirty="0"/>
+          </a:p>
+        </p:txBody>
+      </p:sp>
+      <p:sp>
+        <p:nvSpPr>
+          <p:cNvPr id="4" name="Slide Number Placeholder 3"/>
+          <p:cNvSpPr>
+            <a:spLocks noGrp="1"/>
+          </p:cNvSpPr>
+          <p:nvPr>
+            <p:ph type="sldNum" sz="quarter" idx="5"/>
+          </p:nvPr>
+        </p:nvSpPr>
+        <p:spPr/>
+        <p:txBody>
+          <a:bodyPr/>
+          <a:lstStyle/>
+          <a:p>
+            <a:fld id="{020F486D-935E-4125-8FD7-C735663CC7DE}" type="slidenum">
+              <a:rPr lang="pt-BR" smtClean="0"/>
+              <a:t>13</a:t>
+            </a:fld>
+            <a:endParaRPr lang="pt-BR"/>
+          </a:p>
+        </p:txBody>
+      </p:sp>
+    </p:spTree>
+    <p:extLst>
+      <p:ext uri="{BB962C8B-B14F-4D97-AF65-F5344CB8AC3E}">
+        <p14:creationId xmlns:p14="http://schemas.microsoft.com/office/powerpoint/2010/main" val="36847312"/>
+      </p:ext>
+    </p:extLst>
+  </p:cSld>
+  <p:clrMapOvr>
+    <a:masterClrMapping/>
+  </p:clrMapOvr>
+</p:notes>
+</file>
+
+<file path=ppt/notesSlides/notesSlide14.xml><?xml version="1.0" encoding="utf-8"?>
+<p:notes xmlns:a="http://schemas.openxmlformats.org/drawingml/2006/main" xmlns:r="http://schemas.openxmlformats.org/officeDocument/2006/relationships" xmlns:p="http://schemas.openxmlformats.org/presentationml/2006/main">
+  <p:cSld>
+    <p:spTree>
+      <p:nvGrpSpPr>
+        <p:cNvPr id="1" name=""/>
+        <p:cNvGrpSpPr/>
+        <p:nvPr/>
+      </p:nvGrpSpPr>
+      <p:grpSpPr>
+        <a:xfrm>
+          <a:off x="0" y="0"/>
+          <a:ext cx="0" cy="0"/>
+          <a:chOff x="0" y="0"/>
+          <a:chExt cx="0" cy="0"/>
+        </a:xfrm>
+      </p:grpSpPr>
+      <p:sp>
+        <p:nvSpPr>
+          <p:cNvPr id="2" name="Slide Image Placeholder 1"/>
+          <p:cNvSpPr>
+            <a:spLocks noGrp="1" noRot="1" noChangeAspect="1"/>
+          </p:cNvSpPr>
+          <p:nvPr>
+            <p:ph type="sldImg"/>
+          </p:nvPr>
+        </p:nvSpPr>
+        <p:spPr/>
+      </p:sp>
+      <p:sp>
+        <p:nvSpPr>
+          <p:cNvPr id="3" name="Notes Placeholder 2"/>
+          <p:cNvSpPr>
+            <a:spLocks noGrp="1"/>
+          </p:cNvSpPr>
+          <p:nvPr>
+            <p:ph type="body" idx="1"/>
+          </p:nvPr>
+        </p:nvSpPr>
+        <p:spPr/>
+        <p:txBody>
+          <a:bodyPr/>
+          <a:lstStyle/>
+          <a:p>
+            <a:endParaRPr lang="en-US" dirty="0"/>
+          </a:p>
+        </p:txBody>
+      </p:sp>
+      <p:sp>
+        <p:nvSpPr>
+          <p:cNvPr id="4" name="Slide Number Placeholder 3"/>
+          <p:cNvSpPr>
+            <a:spLocks noGrp="1"/>
+          </p:cNvSpPr>
+          <p:nvPr>
+            <p:ph type="sldNum" sz="quarter" idx="5"/>
+          </p:nvPr>
+        </p:nvSpPr>
+        <p:spPr/>
+        <p:txBody>
+          <a:bodyPr/>
+          <a:lstStyle/>
+          <a:p>
+            <a:fld id="{020F486D-935E-4125-8FD7-C735663CC7DE}" type="slidenum">
+              <a:rPr lang="pt-BR" smtClean="0"/>
+              <a:t>14</a:t>
+            </a:fld>
+            <a:endParaRPr lang="pt-BR"/>
+          </a:p>
+        </p:txBody>
+      </p:sp>
+    </p:spTree>
+    <p:extLst>
+      <p:ext uri="{BB962C8B-B14F-4D97-AF65-F5344CB8AC3E}">
+        <p14:creationId xmlns:p14="http://schemas.microsoft.com/office/powerpoint/2010/main" val="338311157"/>
+      </p:ext>
+    </p:extLst>
+  </p:cSld>
+  <p:clrMapOvr>
+    <a:masterClrMapping/>
+  </p:clrMapOvr>
+</p:notes>
+</file>
+
+<file path=ppt/notesSlides/notesSlide15.xml><?xml version="1.0" encoding="utf-8"?>
+<p:notes xmlns:a="http://schemas.openxmlformats.org/drawingml/2006/main" xmlns:r="http://schemas.openxmlformats.org/officeDocument/2006/relationships" xmlns:p="http://schemas.openxmlformats.org/presentationml/2006/main">
+  <p:cSld>
+    <p:spTree>
+      <p:nvGrpSpPr>
+        <p:cNvPr id="1" name=""/>
+        <p:cNvGrpSpPr/>
+        <p:nvPr/>
+      </p:nvGrpSpPr>
+      <p:grpSpPr>
+        <a:xfrm>
+          <a:off x="0" y="0"/>
+          <a:ext cx="0" cy="0"/>
+          <a:chOff x="0" y="0"/>
+          <a:chExt cx="0" cy="0"/>
+        </a:xfrm>
+      </p:grpSpPr>
+      <p:sp>
+        <p:nvSpPr>
+          <p:cNvPr id="2" name="Slide Image Placeholder 1"/>
+          <p:cNvSpPr>
+            <a:spLocks noGrp="1" noRot="1" noChangeAspect="1"/>
+          </p:cNvSpPr>
+          <p:nvPr>
+            <p:ph type="sldImg"/>
+          </p:nvPr>
+        </p:nvSpPr>
+        <p:spPr/>
+      </p:sp>
+      <p:sp>
+        <p:nvSpPr>
+          <p:cNvPr id="3" name="Notes Placeholder 2"/>
+          <p:cNvSpPr>
+            <a:spLocks noGrp="1"/>
+          </p:cNvSpPr>
+          <p:nvPr>
+            <p:ph type="body" idx="1"/>
+          </p:nvPr>
+        </p:nvSpPr>
+        <p:spPr/>
+        <p:txBody>
+          <a:bodyPr/>
+          <a:lstStyle/>
+          <a:p>
+            <a:endParaRPr lang="en-US" dirty="0"/>
+          </a:p>
+        </p:txBody>
+      </p:sp>
+      <p:sp>
+        <p:nvSpPr>
+          <p:cNvPr id="4" name="Slide Number Placeholder 3"/>
+          <p:cNvSpPr>
+            <a:spLocks noGrp="1"/>
+          </p:cNvSpPr>
+          <p:nvPr>
+            <p:ph type="sldNum" sz="quarter" idx="5"/>
+          </p:nvPr>
+        </p:nvSpPr>
+        <p:spPr/>
+        <p:txBody>
+          <a:bodyPr/>
+          <a:lstStyle/>
+          <a:p>
+            <a:fld id="{020F486D-935E-4125-8FD7-C735663CC7DE}" type="slidenum">
+              <a:rPr lang="pt-BR" smtClean="0"/>
+              <a:t>15</a:t>
+            </a:fld>
+            <a:endParaRPr lang="pt-BR"/>
+          </a:p>
+        </p:txBody>
+      </p:sp>
+    </p:spTree>
+    <p:extLst>
+      <p:ext uri="{BB962C8B-B14F-4D97-AF65-F5344CB8AC3E}">
+        <p14:creationId xmlns:p14="http://schemas.microsoft.com/office/powerpoint/2010/main" val="2266367047"/>
+      </p:ext>
+    </p:extLst>
+  </p:cSld>
+  <p:clrMapOvr>
+    <a:masterClrMapping/>
+  </p:clrMapOvr>
+</p:notes>
+</file>
+
+<file path=ppt/notesSlides/notesSlide16.xml><?xml version="1.0" encoding="utf-8"?>
+<p:notes xmlns:a="http://schemas.openxmlformats.org/drawingml/2006/main" xmlns:r="http://schemas.openxmlformats.org/officeDocument/2006/relationships" xmlns:p="http://schemas.openxmlformats.org/presentationml/2006/main">
+  <p:cSld>
+    <p:spTree>
+      <p:nvGrpSpPr>
+        <p:cNvPr id="1" name=""/>
+        <p:cNvGrpSpPr/>
+        <p:nvPr/>
+      </p:nvGrpSpPr>
+      <p:grpSpPr>
+        <a:xfrm>
+          <a:off x="0" y="0"/>
+          <a:ext cx="0" cy="0"/>
+          <a:chOff x="0" y="0"/>
+          <a:chExt cx="0" cy="0"/>
+        </a:xfrm>
+      </p:grpSpPr>
+      <p:sp>
+        <p:nvSpPr>
+          <p:cNvPr id="2" name="Slide Image Placeholder 1"/>
+          <p:cNvSpPr>
+            <a:spLocks noGrp="1" noRot="1" noChangeAspect="1"/>
+          </p:cNvSpPr>
+          <p:nvPr>
+            <p:ph type="sldImg"/>
+          </p:nvPr>
+        </p:nvSpPr>
+        <p:spPr/>
+      </p:sp>
+      <p:sp>
+        <p:nvSpPr>
+          <p:cNvPr id="3" name="Notes Placeholder 2"/>
+          <p:cNvSpPr>
+            <a:spLocks noGrp="1"/>
+          </p:cNvSpPr>
+          <p:nvPr>
+            <p:ph type="body" idx="1"/>
+          </p:nvPr>
+        </p:nvSpPr>
+        <p:spPr/>
+        <p:txBody>
+          <a:bodyPr/>
+          <a:lstStyle/>
+          <a:p>
+            <a:endParaRPr lang="en-US" dirty="0"/>
+          </a:p>
+        </p:txBody>
+      </p:sp>
+      <p:sp>
+        <p:nvSpPr>
+          <p:cNvPr id="4" name="Slide Number Placeholder 3"/>
+          <p:cNvSpPr>
+            <a:spLocks noGrp="1"/>
+          </p:cNvSpPr>
+          <p:nvPr>
+            <p:ph type="sldNum" sz="quarter" idx="5"/>
+          </p:nvPr>
+        </p:nvSpPr>
+        <p:spPr/>
+        <p:txBody>
+          <a:bodyPr/>
+          <a:lstStyle/>
+          <a:p>
+            <a:fld id="{020F486D-935E-4125-8FD7-C735663CC7DE}" type="slidenum">
+              <a:rPr lang="pt-BR" smtClean="0"/>
+              <a:t>16</a:t>
+            </a:fld>
+            <a:endParaRPr lang="pt-BR"/>
+          </a:p>
+        </p:txBody>
+      </p:sp>
+    </p:spTree>
+    <p:extLst>
+      <p:ext uri="{BB962C8B-B14F-4D97-AF65-F5344CB8AC3E}">
+        <p14:creationId xmlns:p14="http://schemas.microsoft.com/office/powerpoint/2010/main" val="305016876"/>
+      </p:ext>
+    </p:extLst>
+  </p:cSld>
+  <p:clrMapOvr>
+    <a:masterClrMapping/>
+  </p:clrMapOvr>
+</p:notes>
+</file>
+
+<file path=ppt/notesSlides/notesSlide17.xml><?xml version="1.0" encoding="utf-8"?>
+<p:notes xmlns:a="http://schemas.openxmlformats.org/drawingml/2006/main" xmlns:r="http://schemas.openxmlformats.org/officeDocument/2006/relationships" xmlns:p="http://schemas.openxmlformats.org/presentationml/2006/main">
+  <p:cSld>
+    <p:spTree>
+      <p:nvGrpSpPr>
+        <p:cNvPr id="1" name=""/>
+        <p:cNvGrpSpPr/>
+        <p:nvPr/>
+      </p:nvGrpSpPr>
+      <p:grpSpPr>
+        <a:xfrm>
+          <a:off x="0" y="0"/>
+          <a:ext cx="0" cy="0"/>
+          <a:chOff x="0" y="0"/>
+          <a:chExt cx="0" cy="0"/>
+        </a:xfrm>
+      </p:grpSpPr>
+      <p:sp>
+        <p:nvSpPr>
+          <p:cNvPr id="2" name="Slide Image Placeholder 1"/>
+          <p:cNvSpPr>
+            <a:spLocks noGrp="1" noRot="1" noChangeAspect="1"/>
+          </p:cNvSpPr>
+          <p:nvPr>
+            <p:ph type="sldImg"/>
+          </p:nvPr>
+        </p:nvSpPr>
+        <p:spPr/>
+      </p:sp>
+      <p:sp>
+        <p:nvSpPr>
+          <p:cNvPr id="3" name="Notes Placeholder 2"/>
+          <p:cNvSpPr>
+            <a:spLocks noGrp="1"/>
+          </p:cNvSpPr>
+          <p:nvPr>
+            <p:ph type="body" idx="1"/>
+          </p:nvPr>
+        </p:nvSpPr>
+        <p:spPr/>
+        <p:txBody>
+          <a:bodyPr/>
+          <a:lstStyle/>
+          <a:p>
+            <a:endParaRPr lang="en-US" dirty="0"/>
+          </a:p>
+        </p:txBody>
+      </p:sp>
+      <p:sp>
+        <p:nvSpPr>
+          <p:cNvPr id="4" name="Slide Number Placeholder 3"/>
+          <p:cNvSpPr>
+            <a:spLocks noGrp="1"/>
+          </p:cNvSpPr>
+          <p:nvPr>
+            <p:ph type="sldNum" sz="quarter" idx="5"/>
+          </p:nvPr>
+        </p:nvSpPr>
+        <p:spPr/>
+        <p:txBody>
+          <a:bodyPr/>
+          <a:lstStyle/>
+          <a:p>
+            <a:fld id="{020F486D-935E-4125-8FD7-C735663CC7DE}" type="slidenum">
+              <a:rPr lang="pt-BR" smtClean="0"/>
+              <a:t>17</a:t>
+            </a:fld>
+            <a:endParaRPr lang="pt-BR"/>
+          </a:p>
+        </p:txBody>
+      </p:sp>
+    </p:spTree>
+    <p:extLst>
+      <p:ext uri="{BB962C8B-B14F-4D97-AF65-F5344CB8AC3E}">
+        <p14:creationId xmlns:p14="http://schemas.microsoft.com/office/powerpoint/2010/main" val="3730147852"/>
+      </p:ext>
+    </p:extLst>
+  </p:cSld>
+  <p:clrMapOvr>
+    <a:masterClrMapping/>
+  </p:clrMapOvr>
+</p:notes>
+</file>
+
+<file path=ppt/notesSlides/notesSlide18.xml><?xml version="1.0" encoding="utf-8"?>
+<p:notes xmlns:a="http://schemas.openxmlformats.org/drawingml/2006/main" xmlns:r="http://schemas.openxmlformats.org/officeDocument/2006/relationships" xmlns:p="http://schemas.openxmlformats.org/presentationml/2006/main">
+  <p:cSld>
+    <p:spTree>
+      <p:nvGrpSpPr>
+        <p:cNvPr id="1" name=""/>
+        <p:cNvGrpSpPr/>
+        <p:nvPr/>
+      </p:nvGrpSpPr>
+      <p:grpSpPr>
+        <a:xfrm>
+          <a:off x="0" y="0"/>
+          <a:ext cx="0" cy="0"/>
+          <a:chOff x="0" y="0"/>
+          <a:chExt cx="0" cy="0"/>
+        </a:xfrm>
+      </p:grpSpPr>
+      <p:sp>
+        <p:nvSpPr>
+          <p:cNvPr id="2" name="Slide Image Placeholder 1"/>
+          <p:cNvSpPr>
+            <a:spLocks noGrp="1" noRot="1" noChangeAspect="1"/>
+          </p:cNvSpPr>
+          <p:nvPr>
+            <p:ph type="sldImg"/>
+          </p:nvPr>
+        </p:nvSpPr>
+        <p:spPr/>
+      </p:sp>
+      <p:sp>
+        <p:nvSpPr>
+          <p:cNvPr id="3" name="Notes Placeholder 2"/>
+          <p:cNvSpPr>
+            <a:spLocks noGrp="1"/>
+          </p:cNvSpPr>
+          <p:nvPr>
+            <p:ph type="body" idx="1"/>
+          </p:nvPr>
+        </p:nvSpPr>
+        <p:spPr/>
+        <p:txBody>
+          <a:bodyPr/>
+          <a:lstStyle/>
+          <a:p>
+            <a:endParaRPr lang="en-US" dirty="0"/>
+          </a:p>
+        </p:txBody>
+      </p:sp>
+      <p:sp>
+        <p:nvSpPr>
+          <p:cNvPr id="4" name="Slide Number Placeholder 3"/>
+          <p:cNvSpPr>
+            <a:spLocks noGrp="1"/>
+          </p:cNvSpPr>
+          <p:nvPr>
+            <p:ph type="sldNum" sz="quarter" idx="5"/>
+          </p:nvPr>
+        </p:nvSpPr>
+        <p:spPr/>
+        <p:txBody>
+          <a:bodyPr/>
+          <a:lstStyle/>
+          <a:p>
+            <a:fld id="{020F486D-935E-4125-8FD7-C735663CC7DE}" type="slidenum">
+              <a:rPr lang="pt-BR" smtClean="0"/>
+              <a:t>18</a:t>
+            </a:fld>
+            <a:endParaRPr lang="pt-BR"/>
+          </a:p>
+        </p:txBody>
+      </p:sp>
+    </p:spTree>
+    <p:extLst>
+      <p:ext uri="{BB962C8B-B14F-4D97-AF65-F5344CB8AC3E}">
+        <p14:creationId xmlns:p14="http://schemas.microsoft.com/office/powerpoint/2010/main" val="3713785680"/>
+      </p:ext>
+    </p:extLst>
+  </p:cSld>
+  <p:clrMapOvr>
+    <a:masterClrMapping/>
+  </p:clrMapOvr>
+</p:notes>
+</file>
+
+<file path=ppt/notesSlides/notesSlide19.xml><?xml version="1.0" encoding="utf-8"?>
+<p:notes xmlns:a="http://schemas.openxmlformats.org/drawingml/2006/main" xmlns:r="http://schemas.openxmlformats.org/officeDocument/2006/relationships" xmlns:p="http://schemas.openxmlformats.org/presentationml/2006/main">
+  <p:cSld>
+    <p:spTree>
+      <p:nvGrpSpPr>
+        <p:cNvPr id="1" name=""/>
+        <p:cNvGrpSpPr/>
+        <p:nvPr/>
+      </p:nvGrpSpPr>
+      <p:grpSpPr>
+        <a:xfrm>
+          <a:off x="0" y="0"/>
+          <a:ext cx="0" cy="0"/>
+          <a:chOff x="0" y="0"/>
+          <a:chExt cx="0" cy="0"/>
+        </a:xfrm>
+      </p:grpSpPr>
+      <p:sp>
+        <p:nvSpPr>
+          <p:cNvPr id="2" name="Slide Image Placeholder 1"/>
+          <p:cNvSpPr>
+            <a:spLocks noGrp="1" noRot="1" noChangeAspect="1"/>
+          </p:cNvSpPr>
+          <p:nvPr>
+            <p:ph type="sldImg"/>
+          </p:nvPr>
+        </p:nvSpPr>
+        <p:spPr/>
+      </p:sp>
+      <p:sp>
+        <p:nvSpPr>
+          <p:cNvPr id="3" name="Notes Placeholder 2"/>
+          <p:cNvSpPr>
+            <a:spLocks noGrp="1"/>
+          </p:cNvSpPr>
+          <p:nvPr>
+            <p:ph type="body" idx="1"/>
+          </p:nvPr>
+        </p:nvSpPr>
+        <p:spPr/>
+        <p:txBody>
+          <a:bodyPr/>
+          <a:lstStyle/>
+          <a:p>
+            <a:endParaRPr lang="en-US" dirty="0"/>
+          </a:p>
+        </p:txBody>
+      </p:sp>
+      <p:sp>
+        <p:nvSpPr>
+          <p:cNvPr id="4" name="Slide Number Placeholder 3"/>
+          <p:cNvSpPr>
+            <a:spLocks noGrp="1"/>
+          </p:cNvSpPr>
+          <p:nvPr>
+            <p:ph type="sldNum" sz="quarter" idx="5"/>
+          </p:nvPr>
+        </p:nvSpPr>
+        <p:spPr/>
+        <p:txBody>
+          <a:bodyPr/>
+          <a:lstStyle/>
+          <a:p>
+            <a:fld id="{020F486D-935E-4125-8FD7-C735663CC7DE}" type="slidenum">
+              <a:rPr lang="pt-BR" smtClean="0"/>
+              <a:t>19</a:t>
+            </a:fld>
+            <a:endParaRPr lang="pt-BR"/>
+          </a:p>
+        </p:txBody>
+      </p:sp>
+    </p:spTree>
+    <p:extLst>
+      <p:ext uri="{BB962C8B-B14F-4D97-AF65-F5344CB8AC3E}">
+        <p14:creationId xmlns:p14="http://schemas.microsoft.com/office/powerpoint/2010/main" val="946086131"/>
       </p:ext>
     </p:extLst>
   </p:cSld>
@@ -886,6 +1486,426 @@
     <p:extLst>
       <p:ext uri="{BB962C8B-B14F-4D97-AF65-F5344CB8AC3E}">
         <p14:creationId xmlns:p14="http://schemas.microsoft.com/office/powerpoint/2010/main" val="985725297"/>
+      </p:ext>
+    </p:extLst>
+  </p:cSld>
+  <p:clrMapOvr>
+    <a:masterClrMapping/>
+  </p:clrMapOvr>
+</p:notes>
+</file>
+
+<file path=ppt/notesSlides/notesSlide20.xml><?xml version="1.0" encoding="utf-8"?>
+<p:notes xmlns:a="http://schemas.openxmlformats.org/drawingml/2006/main" xmlns:r="http://schemas.openxmlformats.org/officeDocument/2006/relationships" xmlns:p="http://schemas.openxmlformats.org/presentationml/2006/main">
+  <p:cSld>
+    <p:spTree>
+      <p:nvGrpSpPr>
+        <p:cNvPr id="1" name=""/>
+        <p:cNvGrpSpPr/>
+        <p:nvPr/>
+      </p:nvGrpSpPr>
+      <p:grpSpPr>
+        <a:xfrm>
+          <a:off x="0" y="0"/>
+          <a:ext cx="0" cy="0"/>
+          <a:chOff x="0" y="0"/>
+          <a:chExt cx="0" cy="0"/>
+        </a:xfrm>
+      </p:grpSpPr>
+      <p:sp>
+        <p:nvSpPr>
+          <p:cNvPr id="2" name="Slide Image Placeholder 1"/>
+          <p:cNvSpPr>
+            <a:spLocks noGrp="1" noRot="1" noChangeAspect="1"/>
+          </p:cNvSpPr>
+          <p:nvPr>
+            <p:ph type="sldImg"/>
+          </p:nvPr>
+        </p:nvSpPr>
+        <p:spPr/>
+      </p:sp>
+      <p:sp>
+        <p:nvSpPr>
+          <p:cNvPr id="3" name="Notes Placeholder 2"/>
+          <p:cNvSpPr>
+            <a:spLocks noGrp="1"/>
+          </p:cNvSpPr>
+          <p:nvPr>
+            <p:ph type="body" idx="1"/>
+          </p:nvPr>
+        </p:nvSpPr>
+        <p:spPr/>
+        <p:txBody>
+          <a:bodyPr/>
+          <a:lstStyle/>
+          <a:p>
+            <a:endParaRPr lang="en-US" dirty="0"/>
+          </a:p>
+        </p:txBody>
+      </p:sp>
+      <p:sp>
+        <p:nvSpPr>
+          <p:cNvPr id="4" name="Slide Number Placeholder 3"/>
+          <p:cNvSpPr>
+            <a:spLocks noGrp="1"/>
+          </p:cNvSpPr>
+          <p:nvPr>
+            <p:ph type="sldNum" sz="quarter" idx="5"/>
+          </p:nvPr>
+        </p:nvSpPr>
+        <p:spPr/>
+        <p:txBody>
+          <a:bodyPr/>
+          <a:lstStyle/>
+          <a:p>
+            <a:fld id="{020F486D-935E-4125-8FD7-C735663CC7DE}" type="slidenum">
+              <a:rPr lang="pt-BR" smtClean="0"/>
+              <a:t>20</a:t>
+            </a:fld>
+            <a:endParaRPr lang="pt-BR"/>
+          </a:p>
+        </p:txBody>
+      </p:sp>
+    </p:spTree>
+    <p:extLst>
+      <p:ext uri="{BB962C8B-B14F-4D97-AF65-F5344CB8AC3E}">
+        <p14:creationId xmlns:p14="http://schemas.microsoft.com/office/powerpoint/2010/main" val="4231014676"/>
+      </p:ext>
+    </p:extLst>
+  </p:cSld>
+  <p:clrMapOvr>
+    <a:masterClrMapping/>
+  </p:clrMapOvr>
+</p:notes>
+</file>
+
+<file path=ppt/notesSlides/notesSlide21.xml><?xml version="1.0" encoding="utf-8"?>
+<p:notes xmlns:a="http://schemas.openxmlformats.org/drawingml/2006/main" xmlns:r="http://schemas.openxmlformats.org/officeDocument/2006/relationships" xmlns:p="http://schemas.openxmlformats.org/presentationml/2006/main">
+  <p:cSld>
+    <p:spTree>
+      <p:nvGrpSpPr>
+        <p:cNvPr id="1" name=""/>
+        <p:cNvGrpSpPr/>
+        <p:nvPr/>
+      </p:nvGrpSpPr>
+      <p:grpSpPr>
+        <a:xfrm>
+          <a:off x="0" y="0"/>
+          <a:ext cx="0" cy="0"/>
+          <a:chOff x="0" y="0"/>
+          <a:chExt cx="0" cy="0"/>
+        </a:xfrm>
+      </p:grpSpPr>
+      <p:sp>
+        <p:nvSpPr>
+          <p:cNvPr id="2" name="Slide Image Placeholder 1"/>
+          <p:cNvSpPr>
+            <a:spLocks noGrp="1" noRot="1" noChangeAspect="1"/>
+          </p:cNvSpPr>
+          <p:nvPr>
+            <p:ph type="sldImg"/>
+          </p:nvPr>
+        </p:nvSpPr>
+        <p:spPr/>
+      </p:sp>
+      <p:sp>
+        <p:nvSpPr>
+          <p:cNvPr id="3" name="Notes Placeholder 2"/>
+          <p:cNvSpPr>
+            <a:spLocks noGrp="1"/>
+          </p:cNvSpPr>
+          <p:nvPr>
+            <p:ph type="body" idx="1"/>
+          </p:nvPr>
+        </p:nvSpPr>
+        <p:spPr/>
+        <p:txBody>
+          <a:bodyPr/>
+          <a:lstStyle/>
+          <a:p>
+            <a:endParaRPr lang="en-US" dirty="0"/>
+          </a:p>
+        </p:txBody>
+      </p:sp>
+      <p:sp>
+        <p:nvSpPr>
+          <p:cNvPr id="4" name="Slide Number Placeholder 3"/>
+          <p:cNvSpPr>
+            <a:spLocks noGrp="1"/>
+          </p:cNvSpPr>
+          <p:nvPr>
+            <p:ph type="sldNum" sz="quarter" idx="5"/>
+          </p:nvPr>
+        </p:nvSpPr>
+        <p:spPr/>
+        <p:txBody>
+          <a:bodyPr/>
+          <a:lstStyle/>
+          <a:p>
+            <a:fld id="{020F486D-935E-4125-8FD7-C735663CC7DE}" type="slidenum">
+              <a:rPr lang="pt-BR" smtClean="0"/>
+              <a:t>21</a:t>
+            </a:fld>
+            <a:endParaRPr lang="pt-BR"/>
+          </a:p>
+        </p:txBody>
+      </p:sp>
+    </p:spTree>
+    <p:extLst>
+      <p:ext uri="{BB962C8B-B14F-4D97-AF65-F5344CB8AC3E}">
+        <p14:creationId xmlns:p14="http://schemas.microsoft.com/office/powerpoint/2010/main" val="3819084168"/>
+      </p:ext>
+    </p:extLst>
+  </p:cSld>
+  <p:clrMapOvr>
+    <a:masterClrMapping/>
+  </p:clrMapOvr>
+</p:notes>
+</file>
+
+<file path=ppt/notesSlides/notesSlide22.xml><?xml version="1.0" encoding="utf-8"?>
+<p:notes xmlns:a="http://schemas.openxmlformats.org/drawingml/2006/main" xmlns:r="http://schemas.openxmlformats.org/officeDocument/2006/relationships" xmlns:p="http://schemas.openxmlformats.org/presentationml/2006/main">
+  <p:cSld>
+    <p:spTree>
+      <p:nvGrpSpPr>
+        <p:cNvPr id="1" name=""/>
+        <p:cNvGrpSpPr/>
+        <p:nvPr/>
+      </p:nvGrpSpPr>
+      <p:grpSpPr>
+        <a:xfrm>
+          <a:off x="0" y="0"/>
+          <a:ext cx="0" cy="0"/>
+          <a:chOff x="0" y="0"/>
+          <a:chExt cx="0" cy="0"/>
+        </a:xfrm>
+      </p:grpSpPr>
+      <p:sp>
+        <p:nvSpPr>
+          <p:cNvPr id="2" name="Slide Image Placeholder 1"/>
+          <p:cNvSpPr>
+            <a:spLocks noGrp="1" noRot="1" noChangeAspect="1"/>
+          </p:cNvSpPr>
+          <p:nvPr>
+            <p:ph type="sldImg"/>
+          </p:nvPr>
+        </p:nvSpPr>
+        <p:spPr/>
+      </p:sp>
+      <p:sp>
+        <p:nvSpPr>
+          <p:cNvPr id="3" name="Notes Placeholder 2"/>
+          <p:cNvSpPr>
+            <a:spLocks noGrp="1"/>
+          </p:cNvSpPr>
+          <p:nvPr>
+            <p:ph type="body" idx="1"/>
+          </p:nvPr>
+        </p:nvSpPr>
+        <p:spPr/>
+        <p:txBody>
+          <a:bodyPr/>
+          <a:lstStyle/>
+          <a:p>
+            <a:endParaRPr lang="en-US" dirty="0"/>
+          </a:p>
+        </p:txBody>
+      </p:sp>
+      <p:sp>
+        <p:nvSpPr>
+          <p:cNvPr id="4" name="Slide Number Placeholder 3"/>
+          <p:cNvSpPr>
+            <a:spLocks noGrp="1"/>
+          </p:cNvSpPr>
+          <p:nvPr>
+            <p:ph type="sldNum" sz="quarter" idx="5"/>
+          </p:nvPr>
+        </p:nvSpPr>
+        <p:spPr/>
+        <p:txBody>
+          <a:bodyPr/>
+          <a:lstStyle/>
+          <a:p>
+            <a:fld id="{020F486D-935E-4125-8FD7-C735663CC7DE}" type="slidenum">
+              <a:rPr lang="pt-BR" smtClean="0"/>
+              <a:t>22</a:t>
+            </a:fld>
+            <a:endParaRPr lang="pt-BR"/>
+          </a:p>
+        </p:txBody>
+      </p:sp>
+    </p:spTree>
+    <p:extLst>
+      <p:ext uri="{BB962C8B-B14F-4D97-AF65-F5344CB8AC3E}">
+        <p14:creationId xmlns:p14="http://schemas.microsoft.com/office/powerpoint/2010/main" val="2480905305"/>
+      </p:ext>
+    </p:extLst>
+  </p:cSld>
+  <p:clrMapOvr>
+    <a:masterClrMapping/>
+  </p:clrMapOvr>
+</p:notes>
+</file>
+
+<file path=ppt/notesSlides/notesSlide23.xml><?xml version="1.0" encoding="utf-8"?>
+<p:notes xmlns:a="http://schemas.openxmlformats.org/drawingml/2006/main" xmlns:r="http://schemas.openxmlformats.org/officeDocument/2006/relationships" xmlns:p="http://schemas.openxmlformats.org/presentationml/2006/main">
+  <p:cSld>
+    <p:spTree>
+      <p:nvGrpSpPr>
+        <p:cNvPr id="1" name=""/>
+        <p:cNvGrpSpPr/>
+        <p:nvPr/>
+      </p:nvGrpSpPr>
+      <p:grpSpPr>
+        <a:xfrm>
+          <a:off x="0" y="0"/>
+          <a:ext cx="0" cy="0"/>
+          <a:chOff x="0" y="0"/>
+          <a:chExt cx="0" cy="0"/>
+        </a:xfrm>
+      </p:grpSpPr>
+      <p:sp>
+        <p:nvSpPr>
+          <p:cNvPr id="2" name="Slide Image Placeholder 1"/>
+          <p:cNvSpPr>
+            <a:spLocks noGrp="1" noRot="1" noChangeAspect="1"/>
+          </p:cNvSpPr>
+          <p:nvPr>
+            <p:ph type="sldImg"/>
+          </p:nvPr>
+        </p:nvSpPr>
+        <p:spPr/>
+      </p:sp>
+      <p:sp>
+        <p:nvSpPr>
+          <p:cNvPr id="3" name="Notes Placeholder 2"/>
+          <p:cNvSpPr>
+            <a:spLocks noGrp="1"/>
+          </p:cNvSpPr>
+          <p:nvPr>
+            <p:ph type="body" idx="1"/>
+          </p:nvPr>
+        </p:nvSpPr>
+        <p:spPr/>
+        <p:txBody>
+          <a:bodyPr/>
+          <a:lstStyle/>
+          <a:p>
+            <a:endParaRPr lang="en-US" dirty="0"/>
+          </a:p>
+        </p:txBody>
+      </p:sp>
+      <p:sp>
+        <p:nvSpPr>
+          <p:cNvPr id="4" name="Slide Number Placeholder 3"/>
+          <p:cNvSpPr>
+            <a:spLocks noGrp="1"/>
+          </p:cNvSpPr>
+          <p:nvPr>
+            <p:ph type="sldNum" sz="quarter" idx="5"/>
+          </p:nvPr>
+        </p:nvSpPr>
+        <p:spPr/>
+        <p:txBody>
+          <a:bodyPr/>
+          <a:lstStyle/>
+          <a:p>
+            <a:fld id="{020F486D-935E-4125-8FD7-C735663CC7DE}" type="slidenum">
+              <a:rPr lang="pt-BR" smtClean="0"/>
+              <a:t>23</a:t>
+            </a:fld>
+            <a:endParaRPr lang="pt-BR"/>
+          </a:p>
+        </p:txBody>
+      </p:sp>
+    </p:spTree>
+    <p:extLst>
+      <p:ext uri="{BB962C8B-B14F-4D97-AF65-F5344CB8AC3E}">
+        <p14:creationId xmlns:p14="http://schemas.microsoft.com/office/powerpoint/2010/main" val="4190961240"/>
+      </p:ext>
+    </p:extLst>
+  </p:cSld>
+  <p:clrMapOvr>
+    <a:masterClrMapping/>
+  </p:clrMapOvr>
+</p:notes>
+</file>
+
+<file path=ppt/notesSlides/notesSlide24.xml><?xml version="1.0" encoding="utf-8"?>
+<p:notes xmlns:a="http://schemas.openxmlformats.org/drawingml/2006/main" xmlns:r="http://schemas.openxmlformats.org/officeDocument/2006/relationships" xmlns:p="http://schemas.openxmlformats.org/presentationml/2006/main">
+  <p:cSld>
+    <p:spTree>
+      <p:nvGrpSpPr>
+        <p:cNvPr id="1" name=""/>
+        <p:cNvGrpSpPr/>
+        <p:nvPr/>
+      </p:nvGrpSpPr>
+      <p:grpSpPr>
+        <a:xfrm>
+          <a:off x="0" y="0"/>
+          <a:ext cx="0" cy="0"/>
+          <a:chOff x="0" y="0"/>
+          <a:chExt cx="0" cy="0"/>
+        </a:xfrm>
+      </p:grpSpPr>
+      <p:sp>
+        <p:nvSpPr>
+          <p:cNvPr id="2" name="Slide Image Placeholder 1"/>
+          <p:cNvSpPr>
+            <a:spLocks noGrp="1" noRot="1" noChangeAspect="1"/>
+          </p:cNvSpPr>
+          <p:nvPr>
+            <p:ph type="sldImg"/>
+          </p:nvPr>
+        </p:nvSpPr>
+        <p:spPr/>
+      </p:sp>
+      <p:sp>
+        <p:nvSpPr>
+          <p:cNvPr id="3" name="Notes Placeholder 2"/>
+          <p:cNvSpPr>
+            <a:spLocks noGrp="1"/>
+          </p:cNvSpPr>
+          <p:nvPr>
+            <p:ph type="body" idx="1"/>
+          </p:nvPr>
+        </p:nvSpPr>
+        <p:spPr/>
+        <p:txBody>
+          <a:bodyPr/>
+          <a:lstStyle/>
+          <a:p>
+            <a:endParaRPr lang="pt-BR" dirty="0"/>
+          </a:p>
+        </p:txBody>
+      </p:sp>
+      <p:sp>
+        <p:nvSpPr>
+          <p:cNvPr id="4" name="Slide Number Placeholder 3"/>
+          <p:cNvSpPr>
+            <a:spLocks noGrp="1"/>
+          </p:cNvSpPr>
+          <p:nvPr>
+            <p:ph type="sldNum" sz="quarter" idx="5"/>
+          </p:nvPr>
+        </p:nvSpPr>
+        <p:spPr/>
+        <p:txBody>
+          <a:bodyPr/>
+          <a:lstStyle/>
+          <a:p>
+            <a:fld id="{020F486D-935E-4125-8FD7-C735663CC7DE}" type="slidenum">
+              <a:rPr lang="pt-BR" smtClean="0"/>
+              <a:t>24</a:t>
+            </a:fld>
+            <a:endParaRPr lang="pt-BR"/>
+          </a:p>
+        </p:txBody>
+      </p:sp>
+    </p:spTree>
+    <p:extLst>
+      <p:ext uri="{BB962C8B-B14F-4D97-AF65-F5344CB8AC3E}">
+        <p14:creationId xmlns:p14="http://schemas.microsoft.com/office/powerpoint/2010/main" val="1008064520"/>
       </p:ext>
     </p:extLst>
   </p:cSld>
@@ -1642,7 +2662,7 @@
           <a:p>
             <a:fld id="{9642BF85-54FF-46CE-B398-87F998CFD60B}" type="datetimeFigureOut">
               <a:rPr lang="pt-BR" smtClean="0"/>
-              <a:t>28/04/2020</a:t>
+              <a:t>04/05/2020</a:t>
             </a:fld>
             <a:endParaRPr lang="pt-BR"/>
           </a:p>
@@ -1810,7 +2830,7 @@
           <a:p>
             <a:fld id="{9642BF85-54FF-46CE-B398-87F998CFD60B}" type="datetimeFigureOut">
               <a:rPr lang="pt-BR" smtClean="0"/>
-              <a:t>28/04/2020</a:t>
+              <a:t>04/05/2020</a:t>
             </a:fld>
             <a:endParaRPr lang="pt-BR"/>
           </a:p>
@@ -1988,7 +3008,7 @@
           <a:p>
             <a:fld id="{9642BF85-54FF-46CE-B398-87F998CFD60B}" type="datetimeFigureOut">
               <a:rPr lang="pt-BR" smtClean="0"/>
-              <a:t>28/04/2020</a:t>
+              <a:t>04/05/2020</a:t>
             </a:fld>
             <a:endParaRPr lang="pt-BR"/>
           </a:p>
@@ -2325,7 +3345,7 @@
           <a:p>
             <a:fld id="{9642BF85-54FF-46CE-B398-87F998CFD60B}" type="datetimeFigureOut">
               <a:rPr lang="pt-BR" smtClean="0"/>
-              <a:t>28/04/2020</a:t>
+              <a:t>04/05/2020</a:t>
             </a:fld>
             <a:endParaRPr lang="pt-BR"/>
           </a:p>
@@ -2596,7 +3616,7 @@
           <a:p>
             <a:fld id="{9642BF85-54FF-46CE-B398-87F998CFD60B}" type="datetimeFigureOut">
               <a:rPr lang="pt-BR" smtClean="0"/>
-              <a:t>28/04/2020</a:t>
+              <a:t>04/05/2020</a:t>
             </a:fld>
             <a:endParaRPr lang="pt-BR"/>
           </a:p>
@@ -2842,7 +3862,7 @@
           <a:p>
             <a:fld id="{9642BF85-54FF-46CE-B398-87F998CFD60B}" type="datetimeFigureOut">
               <a:rPr lang="pt-BR" smtClean="0"/>
-              <a:t>28/04/2020</a:t>
+              <a:t>04/05/2020</a:t>
             </a:fld>
             <a:endParaRPr lang="pt-BR"/>
           </a:p>
@@ -3206,7 +4226,7 @@
           <a:p>
             <a:fld id="{9642BF85-54FF-46CE-B398-87F998CFD60B}" type="datetimeFigureOut">
               <a:rPr lang="pt-BR" smtClean="0"/>
-              <a:t>28/04/2020</a:t>
+              <a:t>04/05/2020</a:t>
             </a:fld>
             <a:endParaRPr lang="pt-BR"/>
           </a:p>
@@ -3340,7 +4360,7 @@
           <a:p>
             <a:fld id="{9642BF85-54FF-46CE-B398-87F998CFD60B}" type="datetimeFigureOut">
               <a:rPr lang="pt-BR" smtClean="0"/>
-              <a:t>28/04/2020</a:t>
+              <a:t>04/05/2020</a:t>
             </a:fld>
             <a:endParaRPr lang="pt-BR"/>
           </a:p>
@@ -3435,7 +4455,7 @@
           <a:p>
             <a:fld id="{9642BF85-54FF-46CE-B398-87F998CFD60B}" type="datetimeFigureOut">
               <a:rPr lang="pt-BR" smtClean="0"/>
-              <a:t>28/04/2020</a:t>
+              <a:t>04/05/2020</a:t>
             </a:fld>
             <a:endParaRPr lang="pt-BR"/>
           </a:p>
@@ -3710,7 +4730,7 @@
           <a:p>
             <a:fld id="{9642BF85-54FF-46CE-B398-87F998CFD60B}" type="datetimeFigureOut">
               <a:rPr lang="pt-BR" smtClean="0"/>
-              <a:t>28/04/2020</a:t>
+              <a:t>04/05/2020</a:t>
             </a:fld>
             <a:endParaRPr lang="pt-BR"/>
           </a:p>
@@ -3962,7 +4982,7 @@
           <a:p>
             <a:fld id="{9642BF85-54FF-46CE-B398-87F998CFD60B}" type="datetimeFigureOut">
               <a:rPr lang="pt-BR" smtClean="0"/>
-              <a:t>28/04/2020</a:t>
+              <a:t>04/05/2020</a:t>
             </a:fld>
             <a:endParaRPr lang="pt-BR"/>
           </a:p>
@@ -4182,7 +5202,7 @@
           <a:p>
             <a:fld id="{9642BF85-54FF-46CE-B398-87F998CFD60B}" type="datetimeFigureOut">
               <a:rPr lang="pt-BR" smtClean="0"/>
-              <a:t>28/04/2020</a:t>
+              <a:t>04/05/2020</a:t>
             </a:fld>
             <a:endParaRPr lang="pt-BR"/>
           </a:p>
@@ -4732,19 +5752,47 @@
           <a:lstStyle/>
           <a:p>
             <a:r>
-              <a:rPr lang="en-US" dirty="0"/>
-              <a:t>JavaScript also has built-in features, called functions. In order to call a function, we simply write its name (this time without quotes) and end it with a set of parentheses. Try calling the alert function as you see below.</a:t>
-            </a:r>
-          </a:p>
-          <a:p>
-            <a:endParaRPr lang="en-US" dirty="0"/>
-          </a:p>
-          <a:p>
-            <a:r>
-              <a:rPr lang="en-US" dirty="0"/>
-              <a:t>Don't be afraid when a box pops up</a:t>
-            </a:r>
-            <a:endParaRPr lang="pt-BR" dirty="0"/>
+              <a:rPr lang="pt-BR" dirty="0"/>
+              <a:t>O </a:t>
+            </a:r>
+            <a:r>
+              <a:rPr lang="pt-BR" dirty="0" err="1"/>
+              <a:t>JavaScript</a:t>
+            </a:r>
+            <a:r>
+              <a:rPr lang="pt-BR" dirty="0"/>
+              <a:t> possui funções incorporadas para determinadas tarefas.</a:t>
+            </a:r>
+          </a:p>
+          <a:p>
+            <a:r>
+              <a:rPr lang="pt-BR" dirty="0"/>
+              <a:t>Para chamar uma função, nós devemos escrever seu nome com um par de parênteses no final.</a:t>
+            </a:r>
+          </a:p>
+          <a:p>
+            <a:r>
+              <a:rPr lang="pt-BR" dirty="0"/>
+              <a:t>Tente chamar a função </a:t>
+            </a:r>
+            <a:r>
+              <a:rPr lang="pt-BR" dirty="0" err="1"/>
+              <a:t>alert</a:t>
+            </a:r>
+            <a:r>
+              <a:rPr lang="pt-BR" dirty="0"/>
+              <a:t>:</a:t>
+            </a:r>
+          </a:p>
+          <a:p>
+            <a:r>
+              <a:rPr lang="pt-BR" dirty="0" err="1"/>
+              <a:t>alert</a:t>
+            </a:r>
+            <a:r>
+              <a:rPr lang="pt-BR" dirty="0"/>
+              <a:t>();</a:t>
+            </a:r>
           </a:p>
         </p:txBody>
       </p:sp>
@@ -4826,8 +5874,43 @@
               <a:t> </a:t>
             </a:r>
             <a:r>
+              <a:rPr lang="en-US" b="1" dirty="0">
+                <a:latin typeface="Courier New" panose="02070309020205020404" pitchFamily="49" charset="0"/>
+                <a:cs typeface="Courier New" panose="02070309020205020404" pitchFamily="49" charset="0"/>
+              </a:rPr>
+              <a:t>alert()</a:t>
+            </a:r>
+            <a:r>
+              <a:rPr lang="en-US" dirty="0"/>
+              <a:t> no campo de entrada e finalize o </a:t>
+            </a:r>
+            <a:r>
               <a:rPr lang="en-US" dirty="0" err="1"/>
-              <a:t>seu</a:t>
+              <a:t>comando</a:t>
+            </a:r>
+            <a:r>
+              <a:rPr lang="en-US" dirty="0"/>
+              <a:t> com </a:t>
+            </a:r>
+            <a:r>
+              <a:rPr lang="en-US" dirty="0" err="1"/>
+              <a:t>ponto</a:t>
+            </a:r>
+            <a:r>
+              <a:rPr lang="en-US" dirty="0"/>
+              <a:t> e </a:t>
+            </a:r>
+            <a:r>
+              <a:rPr lang="en-US" dirty="0" err="1"/>
+              <a:t>vírgula</a:t>
+            </a:r>
+            <a:r>
+              <a:rPr lang="en-US" dirty="0"/>
+              <a:t>. </a:t>
+            </a:r>
+            <a:r>
+              <a:rPr lang="en-US" dirty="0" err="1"/>
+              <a:t>Depois</a:t>
             </a:r>
             <a:r>
               <a:rPr lang="en-US" dirty="0"/>
@@ -4835,59 +5918,22 @@
             </a:r>
             <a:r>
               <a:rPr lang="en-US" dirty="0" err="1"/>
-              <a:t>nome</a:t>
-            </a:r>
-            <a:r>
-              <a:rPr lang="en-US" dirty="0"/>
-              <a:t>, entre </a:t>
-            </a:r>
-            <a:r>
-              <a:rPr lang="en-US" dirty="0" err="1"/>
-              <a:t>aspas</a:t>
-            </a:r>
-            <a:r>
-              <a:rPr lang="en-US" dirty="0"/>
-              <a:t>, no campo de entrada e finalize o </a:t>
-            </a:r>
-            <a:r>
-              <a:rPr lang="en-US" dirty="0" err="1"/>
-              <a:t>comando</a:t>
-            </a:r>
-            <a:r>
-              <a:rPr lang="en-US" dirty="0"/>
-              <a:t> com </a:t>
-            </a:r>
-            <a:r>
-              <a:rPr lang="en-US" dirty="0" err="1"/>
-              <a:t>ponto</a:t>
-            </a:r>
-            <a:r>
-              <a:rPr lang="en-US" dirty="0"/>
-              <a:t> e </a:t>
-            </a:r>
-            <a:r>
-              <a:rPr lang="en-US" dirty="0" err="1"/>
-              <a:t>vírgula</a:t>
-            </a:r>
-            <a:r>
-              <a:rPr lang="en-US" dirty="0"/>
-              <a:t>. </a:t>
-            </a:r>
-            <a:r>
-              <a:rPr lang="en-US" dirty="0" err="1"/>
-              <a:t>Depois</a:t>
+              <a:t>pressione</a:t>
             </a:r>
             <a:r>
               <a:rPr lang="en-US" dirty="0"/>
               <a:t> </a:t>
             </a:r>
             <a:r>
-              <a:rPr lang="en-US" dirty="0" err="1"/>
-              <a:t>pressione</a:t>
+              <a:rPr lang="en-US" b="1" dirty="0">
+                <a:latin typeface="Courier New" panose="02070309020205020404" pitchFamily="49" charset="0"/>
+                <a:cs typeface="Courier New" panose="02070309020205020404" pitchFamily="49" charset="0"/>
+              </a:rPr>
+              <a:t>Enter</a:t>
             </a:r>
             <a:r>
               <a:rPr lang="en-US" dirty="0"/>
-              <a:t> Enter.</a:t>
+              <a:t>.</a:t>
             </a:r>
             <a:endParaRPr lang="pt-BR" dirty="0"/>
           </a:p>
@@ -4895,10 +5941,10 @@
       </p:sp>
       <p:pic>
         <p:nvPicPr>
-          <p:cNvPr id="2" name="Picture 1">
+          <p:cNvPr id="4" name="Picture 3">
             <a:extLst>
               <a:ext uri="{FF2B5EF4-FFF2-40B4-BE49-F238E27FC236}">
-                <a16:creationId xmlns:a16="http://schemas.microsoft.com/office/drawing/2014/main" id="{02192CAC-6D3A-4385-BF4E-D6E7B9352277}"/>
+                <a16:creationId xmlns:a16="http://schemas.microsoft.com/office/drawing/2014/main" id="{0F5A33A0-60D5-486A-9C5B-36A8B2AEC7DB}"/>
               </a:ext>
             </a:extLst>
           </p:cNvPr>
@@ -4915,8 +5961,8 @@
         </p:blipFill>
         <p:spPr>
           <a:xfrm>
-            <a:off x="1827040" y="2668430"/>
-            <a:ext cx="8686800" cy="3409950"/>
+            <a:off x="3181350" y="3174433"/>
+            <a:ext cx="5829300" cy="2381250"/>
           </a:xfrm>
           <a:prstGeom prst="rect">
             <a:avLst/>
@@ -4965,6 +6011,28 @@
         </p:nvSpPr>
         <p:spPr/>
         <p:txBody>
+          <a:bodyPr/>
+          <a:lstStyle/>
+          <a:p>
+            <a:r>
+              <a:rPr lang="pt-BR" dirty="0"/>
+              <a:t>JavaScript.com - 03</a:t>
+            </a:r>
+          </a:p>
+        </p:txBody>
+      </p:sp>
+      <p:sp>
+        <p:nvSpPr>
+          <p:cNvPr id="6" name="Espaço Reservado para Conteúdo 5"/>
+          <p:cNvSpPr>
+            <a:spLocks noGrp="1"/>
+          </p:cNvSpPr>
+          <p:nvPr>
+            <p:ph idx="1"/>
+          </p:nvPr>
+        </p:nvSpPr>
+        <p:spPr/>
+        <p:txBody>
           <a:bodyPr>
             <a:normAutofit/>
           </a:bodyPr>
@@ -4972,7 +6040,97 @@
           <a:p>
             <a:r>
               <a:rPr lang="pt-BR" dirty="0"/>
-              <a:t>Referências</a:t>
+              <a:t>Muitas funções (como a função </a:t>
+            </a:r>
+            <a:r>
+              <a:rPr lang="pt-BR" dirty="0" err="1"/>
+              <a:t>alert</a:t>
+            </a:r>
+            <a:r>
+              <a:rPr lang="pt-BR" dirty="0"/>
+              <a:t>) podem receber dados, que chamamos de </a:t>
+            </a:r>
+            <a:r>
+              <a:rPr lang="pt-BR" b="1" dirty="0"/>
+              <a:t>parâmetros</a:t>
+            </a:r>
+            <a:r>
+              <a:rPr lang="pt-BR" dirty="0"/>
+              <a:t>.</a:t>
+            </a:r>
+          </a:p>
+          <a:p>
+            <a:r>
+              <a:rPr lang="pt-BR" dirty="0"/>
+              <a:t>Passando uma </a:t>
+            </a:r>
+            <a:r>
+              <a:rPr lang="pt-BR" dirty="0" err="1"/>
+              <a:t>string</a:t>
+            </a:r>
+            <a:r>
+              <a:rPr lang="pt-BR" dirty="0"/>
+              <a:t> como parâmetro para a função </a:t>
+            </a:r>
+            <a:r>
+              <a:rPr lang="pt-BR" dirty="0" err="1"/>
+              <a:t>alert</a:t>
+            </a:r>
+            <a:r>
+              <a:rPr lang="pt-BR" dirty="0"/>
+              <a:t>, nós podemos exibir um texto no pop-up que será aberto.</a:t>
+            </a:r>
+          </a:p>
+        </p:txBody>
+      </p:sp>
+    </p:spTree>
+    <p:extLst>
+      <p:ext uri="{BB962C8B-B14F-4D97-AF65-F5344CB8AC3E}">
+        <p14:creationId xmlns:p14="http://schemas.microsoft.com/office/powerpoint/2010/main" val="983913759"/>
+      </p:ext>
+    </p:extLst>
+  </p:cSld>
+  <p:clrMapOvr>
+    <a:masterClrMapping/>
+  </p:clrMapOvr>
+</p:sld>
+</file>
+
+<file path=ppt/slides/slide13.xml><?xml version="1.0" encoding="utf-8"?>
+<p:sld xmlns:a="http://schemas.openxmlformats.org/drawingml/2006/main" xmlns:r="http://schemas.openxmlformats.org/officeDocument/2006/relationships" xmlns:p="http://schemas.openxmlformats.org/presentationml/2006/main">
+  <p:cSld>
+    <p:spTree>
+      <p:nvGrpSpPr>
+        <p:cNvPr id="1" name=""/>
+        <p:cNvGrpSpPr/>
+        <p:nvPr/>
+      </p:nvGrpSpPr>
+      <p:grpSpPr>
+        <a:xfrm>
+          <a:off x="0" y="0"/>
+          <a:ext cx="0" cy="0"/>
+          <a:chOff x="0" y="0"/>
+          <a:chExt cx="0" cy="0"/>
+        </a:xfrm>
+      </p:grpSpPr>
+      <p:sp>
+        <p:nvSpPr>
+          <p:cNvPr id="5" name="Título 4"/>
+          <p:cNvSpPr>
+            <a:spLocks noGrp="1"/>
+          </p:cNvSpPr>
+          <p:nvPr>
+            <p:ph type="title"/>
+          </p:nvPr>
+        </p:nvSpPr>
+        <p:spPr/>
+        <p:txBody>
+          <a:bodyPr/>
+          <a:lstStyle/>
+          <a:p>
+            <a:r>
+              <a:rPr lang="pt-BR" dirty="0"/>
+              <a:t>JavaScript.com - 03</a:t>
             </a:r>
           </a:p>
         </p:txBody>
@@ -4987,12 +6145,7 @@
             <p:ph idx="1"/>
           </p:nvPr>
         </p:nvSpPr>
-        <p:spPr>
-          <a:xfrm>
-            <a:off x="317694" y="1291052"/>
-            <a:ext cx="11705493" cy="5011777"/>
-          </a:xfrm>
-        </p:spPr>
+        <p:spPr/>
         <p:txBody>
           <a:bodyPr>
             <a:normAutofit/>
@@ -5000,49 +6153,983 @@
           <a:lstStyle/>
           <a:p>
             <a:r>
-              <a:rPr lang="pt-BR" dirty="0">
-                <a:hlinkClick r:id="rId3"/>
+              <a:rPr lang="en-US" dirty="0" err="1"/>
+              <a:t>Digite</a:t>
+            </a:r>
+            <a:r>
+              <a:rPr lang="en-US" dirty="0"/>
+              <a:t> </a:t>
+            </a:r>
+            <a:r>
+              <a:rPr lang="en-US" b="1" dirty="0">
+                <a:latin typeface="Courier New" panose="02070309020205020404" pitchFamily="49" charset="0"/>
+                <a:cs typeface="Courier New" panose="02070309020205020404" pitchFamily="49" charset="0"/>
               </a:rPr>
-              <a:t>https://www.devmedia.com.br/quem-quer-ser-um-programador-fullstack/38786</a:t>
+              <a:t>alert(“</a:t>
+            </a:r>
+            <a:r>
+              <a:rPr lang="en-US" b="1" dirty="0" err="1">
+                <a:latin typeface="Courier New" panose="02070309020205020404" pitchFamily="49" charset="0"/>
+                <a:cs typeface="Courier New" panose="02070309020205020404" pitchFamily="49" charset="0"/>
+              </a:rPr>
+              <a:t>seu</a:t>
+            </a:r>
+            <a:r>
+              <a:rPr lang="en-US" b="1" dirty="0">
+                <a:latin typeface="Courier New" panose="02070309020205020404" pitchFamily="49" charset="0"/>
+                <a:cs typeface="Courier New" panose="02070309020205020404" pitchFamily="49" charset="0"/>
+              </a:rPr>
+              <a:t> </a:t>
+            </a:r>
+            <a:r>
+              <a:rPr lang="en-US" b="1" dirty="0" err="1">
+                <a:latin typeface="Courier New" panose="02070309020205020404" pitchFamily="49" charset="0"/>
+                <a:cs typeface="Courier New" panose="02070309020205020404" pitchFamily="49" charset="0"/>
+              </a:rPr>
+              <a:t>nome</a:t>
+            </a:r>
+            <a:r>
+              <a:rPr lang="en-US" b="1" dirty="0">
+                <a:latin typeface="Courier New" panose="02070309020205020404" pitchFamily="49" charset="0"/>
+                <a:cs typeface="Courier New" panose="02070309020205020404" pitchFamily="49" charset="0"/>
+              </a:rPr>
+              <a:t>”)</a:t>
+            </a:r>
+            <a:r>
+              <a:rPr lang="en-US" dirty="0"/>
+              <a:t> no campo de entrada e finalize o </a:t>
+            </a:r>
+            <a:r>
+              <a:rPr lang="en-US" dirty="0" err="1"/>
+              <a:t>comando</a:t>
+            </a:r>
+            <a:r>
+              <a:rPr lang="en-US" dirty="0"/>
+              <a:t> com </a:t>
+            </a:r>
+            <a:r>
+              <a:rPr lang="en-US" dirty="0" err="1"/>
+              <a:t>ponto</a:t>
+            </a:r>
+            <a:r>
+              <a:rPr lang="en-US" dirty="0"/>
+              <a:t> e </a:t>
+            </a:r>
+            <a:r>
+              <a:rPr lang="en-US" dirty="0" err="1"/>
+              <a:t>vírgula</a:t>
+            </a:r>
+            <a:r>
+              <a:rPr lang="en-US" dirty="0"/>
+              <a:t>. </a:t>
+            </a:r>
+            <a:r>
+              <a:rPr lang="en-US" dirty="0" err="1"/>
+              <a:t>Depois</a:t>
+            </a:r>
+            <a:r>
+              <a:rPr lang="en-US" dirty="0"/>
+              <a:t> </a:t>
+            </a:r>
+            <a:r>
+              <a:rPr lang="en-US" dirty="0" err="1"/>
+              <a:t>pressione</a:t>
+            </a:r>
+            <a:r>
+              <a:rPr lang="en-US" dirty="0"/>
+              <a:t> </a:t>
+            </a:r>
+            <a:r>
+              <a:rPr lang="en-US" b="1" dirty="0">
+                <a:latin typeface="Courier New" panose="02070309020205020404" pitchFamily="49" charset="0"/>
+                <a:cs typeface="Courier New" panose="02070309020205020404" pitchFamily="49" charset="0"/>
+              </a:rPr>
+              <a:t>Enter</a:t>
+            </a:r>
+            <a:r>
+              <a:rPr lang="en-US" dirty="0"/>
+              <a:t>.</a:t>
             </a:r>
             <a:endParaRPr lang="pt-BR" dirty="0"/>
           </a:p>
-          <a:p>
-            <a:r>
-              <a:rPr lang="en-US" dirty="0">
-                <a:hlinkClick r:id="rId4"/>
-              </a:rPr>
-              <a:t>https://www.w3schools.com/js/default.asp</a:t>
-            </a:r>
-            <a:endParaRPr lang="en-US" dirty="0"/>
-          </a:p>
-          <a:p>
-            <a:r>
-              <a:rPr lang="en-US" dirty="0">
-                <a:hlinkClick r:id="rId5"/>
-              </a:rPr>
-              <a:t>https://developer.mozilla.org/en-US/docs/Web/JavaScript</a:t>
-            </a:r>
-            <a:endParaRPr lang="en-US" dirty="0"/>
-          </a:p>
-          <a:p>
-            <a:r>
-              <a:rPr lang="en-US" dirty="0">
-                <a:hlinkClick r:id="rId6"/>
-              </a:rPr>
-              <a:t>https://universidadedatecnologia.com.br/o-que-e-linguagem-de-programacao/</a:t>
-            </a:r>
-            <a:endParaRPr lang="en-US" dirty="0"/>
-          </a:p>
-          <a:p>
-            <a:endParaRPr lang="pt-BR" dirty="0"/>
-          </a:p>
-        </p:txBody>
-      </p:sp>
+        </p:txBody>
+      </p:sp>
+      <p:pic>
+        <p:nvPicPr>
+          <p:cNvPr id="2" name="Picture 1">
+            <a:extLst>
+              <a:ext uri="{FF2B5EF4-FFF2-40B4-BE49-F238E27FC236}">
+                <a16:creationId xmlns:a16="http://schemas.microsoft.com/office/drawing/2014/main" id="{23CD1B66-415B-465D-9339-D04A3EFC47C5}"/>
+              </a:ext>
+            </a:extLst>
+          </p:cNvPr>
+          <p:cNvPicPr>
+            <a:picLocks noChangeAspect="1"/>
+          </p:cNvPicPr>
+          <p:nvPr/>
+        </p:nvPicPr>
+        <p:blipFill>
+          <a:blip r:embed="rId3"/>
+          <a:stretch>
+            <a:fillRect/>
+          </a:stretch>
+        </p:blipFill>
+        <p:spPr>
+          <a:xfrm>
+            <a:off x="2114550" y="2908716"/>
+            <a:ext cx="7962900" cy="2733675"/>
+          </a:xfrm>
+          <a:prstGeom prst="rect">
+            <a:avLst/>
+          </a:prstGeom>
+        </p:spPr>
+      </p:pic>
     </p:spTree>
     <p:extLst>
       <p:ext uri="{BB962C8B-B14F-4D97-AF65-F5344CB8AC3E}">
-        <p14:creationId xmlns:p14="http://schemas.microsoft.com/office/powerpoint/2010/main" val="2436293185"/>
+        <p14:creationId xmlns:p14="http://schemas.microsoft.com/office/powerpoint/2010/main" val="2383332442"/>
+      </p:ext>
+    </p:extLst>
+  </p:cSld>
+  <p:clrMapOvr>
+    <a:masterClrMapping/>
+  </p:clrMapOvr>
+</p:sld>
+</file>
+
+<file path=ppt/slides/slide14.xml><?xml version="1.0" encoding="utf-8"?>
+<p:sld xmlns:a="http://schemas.openxmlformats.org/drawingml/2006/main" xmlns:r="http://schemas.openxmlformats.org/officeDocument/2006/relationships" xmlns:p="http://schemas.openxmlformats.org/presentationml/2006/main">
+  <p:cSld>
+    <p:spTree>
+      <p:nvGrpSpPr>
+        <p:cNvPr id="1" name=""/>
+        <p:cNvGrpSpPr/>
+        <p:nvPr/>
+      </p:nvGrpSpPr>
+      <p:grpSpPr>
+        <a:xfrm>
+          <a:off x="0" y="0"/>
+          <a:ext cx="0" cy="0"/>
+          <a:chOff x="0" y="0"/>
+          <a:chExt cx="0" cy="0"/>
+        </a:xfrm>
+      </p:grpSpPr>
+      <p:sp>
+        <p:nvSpPr>
+          <p:cNvPr id="5" name="Título 4"/>
+          <p:cNvSpPr>
+            <a:spLocks noGrp="1"/>
+          </p:cNvSpPr>
+          <p:nvPr>
+            <p:ph type="title"/>
+          </p:nvPr>
+        </p:nvSpPr>
+        <p:spPr/>
+        <p:txBody>
+          <a:bodyPr/>
+          <a:lstStyle/>
+          <a:p>
+            <a:r>
+              <a:rPr lang="pt-BR" dirty="0"/>
+              <a:t>JavaScript.com - 04</a:t>
+            </a:r>
+          </a:p>
+        </p:txBody>
+      </p:sp>
+      <p:sp>
+        <p:nvSpPr>
+          <p:cNvPr id="6" name="Espaço Reservado para Conteúdo 5"/>
+          <p:cNvSpPr>
+            <a:spLocks noGrp="1"/>
+          </p:cNvSpPr>
+          <p:nvPr>
+            <p:ph idx="1"/>
+          </p:nvPr>
+        </p:nvSpPr>
+        <p:spPr/>
+        <p:txBody>
+          <a:bodyPr>
+            <a:normAutofit/>
+          </a:bodyPr>
+          <a:lstStyle/>
+          <a:p>
+            <a:r>
+              <a:rPr lang="pt-BR" dirty="0"/>
+              <a:t>Em programação, frequentemente, precisamos guardar dados para usá-los depois.</a:t>
+            </a:r>
+          </a:p>
+          <a:p>
+            <a:r>
+              <a:rPr lang="pt-BR" dirty="0"/>
+              <a:t>Chamamos de variáveis os locais onde guardamos esses dados.</a:t>
+            </a:r>
+          </a:p>
+          <a:p>
+            <a:r>
+              <a:rPr lang="pt-BR" dirty="0"/>
+              <a:t>Vamos guardar seu nome em uma variável?</a:t>
+            </a:r>
+          </a:p>
+        </p:txBody>
+      </p:sp>
+    </p:spTree>
+    <p:extLst>
+      <p:ext uri="{BB962C8B-B14F-4D97-AF65-F5344CB8AC3E}">
+        <p14:creationId xmlns:p14="http://schemas.microsoft.com/office/powerpoint/2010/main" val="3640422564"/>
+      </p:ext>
+    </p:extLst>
+  </p:cSld>
+  <p:clrMapOvr>
+    <a:masterClrMapping/>
+  </p:clrMapOvr>
+</p:sld>
+</file>
+
+<file path=ppt/slides/slide15.xml><?xml version="1.0" encoding="utf-8"?>
+<p:sld xmlns:a="http://schemas.openxmlformats.org/drawingml/2006/main" xmlns:r="http://schemas.openxmlformats.org/officeDocument/2006/relationships" xmlns:p="http://schemas.openxmlformats.org/presentationml/2006/main">
+  <p:cSld>
+    <p:spTree>
+      <p:nvGrpSpPr>
+        <p:cNvPr id="1" name=""/>
+        <p:cNvGrpSpPr/>
+        <p:nvPr/>
+      </p:nvGrpSpPr>
+      <p:grpSpPr>
+        <a:xfrm>
+          <a:off x="0" y="0"/>
+          <a:ext cx="0" cy="0"/>
+          <a:chOff x="0" y="0"/>
+          <a:chExt cx="0" cy="0"/>
+        </a:xfrm>
+      </p:grpSpPr>
+      <p:sp>
+        <p:nvSpPr>
+          <p:cNvPr id="5" name="Título 4"/>
+          <p:cNvSpPr>
+            <a:spLocks noGrp="1"/>
+          </p:cNvSpPr>
+          <p:nvPr>
+            <p:ph type="title"/>
+          </p:nvPr>
+        </p:nvSpPr>
+        <p:spPr/>
+        <p:txBody>
+          <a:bodyPr/>
+          <a:lstStyle/>
+          <a:p>
+            <a:r>
+              <a:rPr lang="pt-BR" dirty="0"/>
+              <a:t>JavaScript.com - 04</a:t>
+            </a:r>
+          </a:p>
+        </p:txBody>
+      </p:sp>
+      <p:sp>
+        <p:nvSpPr>
+          <p:cNvPr id="6" name="Espaço Reservado para Conteúdo 5"/>
+          <p:cNvSpPr>
+            <a:spLocks noGrp="1"/>
+          </p:cNvSpPr>
+          <p:nvPr>
+            <p:ph idx="1"/>
+          </p:nvPr>
+        </p:nvSpPr>
+        <p:spPr/>
+        <p:txBody>
+          <a:bodyPr>
+            <a:normAutofit/>
+          </a:bodyPr>
+          <a:lstStyle/>
+          <a:p>
+            <a:r>
+              <a:rPr lang="en-US" dirty="0" err="1"/>
+              <a:t>Digite</a:t>
+            </a:r>
+            <a:r>
+              <a:rPr lang="en-US" dirty="0"/>
+              <a:t> </a:t>
+            </a:r>
+            <a:r>
+              <a:rPr lang="en-US" b="1" dirty="0">
+                <a:latin typeface="Courier New" panose="02070309020205020404" pitchFamily="49" charset="0"/>
+                <a:cs typeface="Courier New" panose="02070309020205020404" pitchFamily="49" charset="0"/>
+              </a:rPr>
+              <a:t>var </a:t>
+            </a:r>
+            <a:r>
+              <a:rPr lang="en-US" b="1" dirty="0" err="1">
+                <a:latin typeface="Courier New" panose="02070309020205020404" pitchFamily="49" charset="0"/>
+                <a:cs typeface="Courier New" panose="02070309020205020404" pitchFamily="49" charset="0"/>
+              </a:rPr>
+              <a:t>firstName</a:t>
+            </a:r>
+            <a:r>
+              <a:rPr lang="en-US" b="1" dirty="0">
+                <a:latin typeface="Courier New" panose="02070309020205020404" pitchFamily="49" charset="0"/>
+                <a:cs typeface="Courier New" panose="02070309020205020404" pitchFamily="49" charset="0"/>
+              </a:rPr>
+              <a:t> = “</a:t>
+            </a:r>
+            <a:r>
+              <a:rPr lang="en-US" b="1" dirty="0" err="1">
+                <a:latin typeface="Courier New" panose="02070309020205020404" pitchFamily="49" charset="0"/>
+                <a:cs typeface="Courier New" panose="02070309020205020404" pitchFamily="49" charset="0"/>
+              </a:rPr>
+              <a:t>seu</a:t>
+            </a:r>
+            <a:r>
+              <a:rPr lang="en-US" b="1" dirty="0">
+                <a:latin typeface="Courier New" panose="02070309020205020404" pitchFamily="49" charset="0"/>
+                <a:cs typeface="Courier New" panose="02070309020205020404" pitchFamily="49" charset="0"/>
+              </a:rPr>
+              <a:t> </a:t>
+            </a:r>
+            <a:r>
+              <a:rPr lang="en-US" b="1" dirty="0" err="1">
+                <a:latin typeface="Courier New" panose="02070309020205020404" pitchFamily="49" charset="0"/>
+                <a:cs typeface="Courier New" panose="02070309020205020404" pitchFamily="49" charset="0"/>
+              </a:rPr>
+              <a:t>nome</a:t>
+            </a:r>
+            <a:r>
+              <a:rPr lang="en-US" b="1" dirty="0">
+                <a:latin typeface="Courier New" panose="02070309020205020404" pitchFamily="49" charset="0"/>
+                <a:cs typeface="Courier New" panose="02070309020205020404" pitchFamily="49" charset="0"/>
+              </a:rPr>
+              <a:t>”</a:t>
+            </a:r>
+            <a:r>
+              <a:rPr lang="en-US" dirty="0"/>
+              <a:t> no campo de entrada e finalize o </a:t>
+            </a:r>
+            <a:r>
+              <a:rPr lang="en-US" dirty="0" err="1"/>
+              <a:t>comando</a:t>
+            </a:r>
+            <a:r>
+              <a:rPr lang="en-US" dirty="0"/>
+              <a:t> com </a:t>
+            </a:r>
+            <a:r>
+              <a:rPr lang="en-US" dirty="0" err="1"/>
+              <a:t>ponto</a:t>
+            </a:r>
+            <a:r>
+              <a:rPr lang="en-US" dirty="0"/>
+              <a:t> e </a:t>
+            </a:r>
+            <a:r>
+              <a:rPr lang="en-US" dirty="0" err="1"/>
+              <a:t>vírgula</a:t>
+            </a:r>
+            <a:r>
+              <a:rPr lang="en-US" dirty="0"/>
+              <a:t>. </a:t>
+            </a:r>
+            <a:r>
+              <a:rPr lang="en-US" dirty="0" err="1"/>
+              <a:t>Depois</a:t>
+            </a:r>
+            <a:r>
+              <a:rPr lang="en-US" dirty="0"/>
+              <a:t> </a:t>
+            </a:r>
+            <a:r>
+              <a:rPr lang="en-US" dirty="0" err="1"/>
+              <a:t>pressione</a:t>
+            </a:r>
+            <a:r>
+              <a:rPr lang="en-US" dirty="0"/>
+              <a:t> </a:t>
+            </a:r>
+            <a:r>
+              <a:rPr lang="en-US" b="1" dirty="0">
+                <a:latin typeface="Courier New" panose="02070309020205020404" pitchFamily="49" charset="0"/>
+                <a:cs typeface="Courier New" panose="02070309020205020404" pitchFamily="49" charset="0"/>
+              </a:rPr>
+              <a:t>Enter</a:t>
+            </a:r>
+            <a:r>
+              <a:rPr lang="en-US" dirty="0"/>
+              <a:t>.</a:t>
+            </a:r>
+            <a:endParaRPr lang="pt-BR" dirty="0"/>
+          </a:p>
+        </p:txBody>
+      </p:sp>
+      <p:pic>
+        <p:nvPicPr>
+          <p:cNvPr id="3" name="Picture 2">
+            <a:extLst>
+              <a:ext uri="{FF2B5EF4-FFF2-40B4-BE49-F238E27FC236}">
+                <a16:creationId xmlns:a16="http://schemas.microsoft.com/office/drawing/2014/main" id="{617A3D87-63A3-444D-B6B1-8CCC321DA928}"/>
+              </a:ext>
+            </a:extLst>
+          </p:cNvPr>
+          <p:cNvPicPr>
+            <a:picLocks noChangeAspect="1"/>
+          </p:cNvPicPr>
+          <p:nvPr/>
+        </p:nvPicPr>
+        <p:blipFill>
+          <a:blip r:embed="rId3"/>
+          <a:stretch>
+            <a:fillRect/>
+          </a:stretch>
+        </p:blipFill>
+        <p:spPr>
+          <a:xfrm>
+            <a:off x="2024063" y="2791505"/>
+            <a:ext cx="8143875" cy="3267075"/>
+          </a:xfrm>
+          <a:prstGeom prst="rect">
+            <a:avLst/>
+          </a:prstGeom>
+        </p:spPr>
+      </p:pic>
+    </p:spTree>
+    <p:extLst>
+      <p:ext uri="{BB962C8B-B14F-4D97-AF65-F5344CB8AC3E}">
+        <p14:creationId xmlns:p14="http://schemas.microsoft.com/office/powerpoint/2010/main" val="2170823899"/>
+      </p:ext>
+    </p:extLst>
+  </p:cSld>
+  <p:clrMapOvr>
+    <a:masterClrMapping/>
+  </p:clrMapOvr>
+</p:sld>
+</file>
+
+<file path=ppt/slides/slide16.xml><?xml version="1.0" encoding="utf-8"?>
+<p:sld xmlns:a="http://schemas.openxmlformats.org/drawingml/2006/main" xmlns:r="http://schemas.openxmlformats.org/officeDocument/2006/relationships" xmlns:p="http://schemas.openxmlformats.org/presentationml/2006/main">
+  <p:cSld>
+    <p:spTree>
+      <p:nvGrpSpPr>
+        <p:cNvPr id="1" name=""/>
+        <p:cNvGrpSpPr/>
+        <p:nvPr/>
+      </p:nvGrpSpPr>
+      <p:grpSpPr>
+        <a:xfrm>
+          <a:off x="0" y="0"/>
+          <a:ext cx="0" cy="0"/>
+          <a:chOff x="0" y="0"/>
+          <a:chExt cx="0" cy="0"/>
+        </a:xfrm>
+      </p:grpSpPr>
+      <p:sp>
+        <p:nvSpPr>
+          <p:cNvPr id="5" name="Título 4"/>
+          <p:cNvSpPr>
+            <a:spLocks noGrp="1"/>
+          </p:cNvSpPr>
+          <p:nvPr>
+            <p:ph type="title"/>
+          </p:nvPr>
+        </p:nvSpPr>
+        <p:spPr/>
+        <p:txBody>
+          <a:bodyPr/>
+          <a:lstStyle/>
+          <a:p>
+            <a:r>
+              <a:rPr lang="pt-BR" dirty="0"/>
+              <a:t>JavaScript.com - 05</a:t>
+            </a:r>
+          </a:p>
+        </p:txBody>
+      </p:sp>
+      <p:sp>
+        <p:nvSpPr>
+          <p:cNvPr id="6" name="Espaço Reservado para Conteúdo 5"/>
+          <p:cNvSpPr>
+            <a:spLocks noGrp="1"/>
+          </p:cNvSpPr>
+          <p:nvPr>
+            <p:ph idx="1"/>
+          </p:nvPr>
+        </p:nvSpPr>
+        <p:spPr/>
+        <p:txBody>
+          <a:bodyPr>
+            <a:normAutofit/>
+          </a:bodyPr>
+          <a:lstStyle/>
+          <a:p>
+            <a:r>
+              <a:rPr lang="pt-BR" dirty="0"/>
+              <a:t>Agora nós temos uma variável chamada </a:t>
+            </a:r>
+            <a:r>
+              <a:rPr lang="pt-BR" b="1" dirty="0" err="1">
+                <a:latin typeface="Courier New" panose="02070309020205020404" pitchFamily="49" charset="0"/>
+                <a:cs typeface="Courier New" panose="02070309020205020404" pitchFamily="49" charset="0"/>
+              </a:rPr>
+              <a:t>firstName</a:t>
+            </a:r>
+            <a:r>
+              <a:rPr lang="pt-BR" dirty="0"/>
+              <a:t> que tem uma </a:t>
+            </a:r>
+            <a:r>
+              <a:rPr lang="pt-BR" dirty="0" err="1"/>
+              <a:t>string</a:t>
+            </a:r>
+            <a:r>
+              <a:rPr lang="pt-BR" dirty="0"/>
+              <a:t> armazenada. Basta requisitá-la para recuperarmos o valor </a:t>
+            </a:r>
+            <a:r>
+              <a:rPr lang="pt-BR" dirty="0" err="1"/>
+              <a:t>amazenado</a:t>
+            </a:r>
+            <a:r>
+              <a:rPr lang="pt-BR" dirty="0"/>
+              <a:t>.</a:t>
+            </a:r>
+          </a:p>
+        </p:txBody>
+      </p:sp>
+    </p:spTree>
+    <p:extLst>
+      <p:ext uri="{BB962C8B-B14F-4D97-AF65-F5344CB8AC3E}">
+        <p14:creationId xmlns:p14="http://schemas.microsoft.com/office/powerpoint/2010/main" val="2501353279"/>
+      </p:ext>
+    </p:extLst>
+  </p:cSld>
+  <p:clrMapOvr>
+    <a:masterClrMapping/>
+  </p:clrMapOvr>
+</p:sld>
+</file>
+
+<file path=ppt/slides/slide17.xml><?xml version="1.0" encoding="utf-8"?>
+<p:sld xmlns:a="http://schemas.openxmlformats.org/drawingml/2006/main" xmlns:r="http://schemas.openxmlformats.org/officeDocument/2006/relationships" xmlns:p="http://schemas.openxmlformats.org/presentationml/2006/main">
+  <p:cSld>
+    <p:spTree>
+      <p:nvGrpSpPr>
+        <p:cNvPr id="1" name=""/>
+        <p:cNvGrpSpPr/>
+        <p:nvPr/>
+      </p:nvGrpSpPr>
+      <p:grpSpPr>
+        <a:xfrm>
+          <a:off x="0" y="0"/>
+          <a:ext cx="0" cy="0"/>
+          <a:chOff x="0" y="0"/>
+          <a:chExt cx="0" cy="0"/>
+        </a:xfrm>
+      </p:grpSpPr>
+      <p:sp>
+        <p:nvSpPr>
+          <p:cNvPr id="5" name="Título 4"/>
+          <p:cNvSpPr>
+            <a:spLocks noGrp="1"/>
+          </p:cNvSpPr>
+          <p:nvPr>
+            <p:ph type="title"/>
+          </p:nvPr>
+        </p:nvSpPr>
+        <p:spPr/>
+        <p:txBody>
+          <a:bodyPr/>
+          <a:lstStyle/>
+          <a:p>
+            <a:r>
+              <a:rPr lang="pt-BR" dirty="0"/>
+              <a:t>JavaScript.com - 05</a:t>
+            </a:r>
+          </a:p>
+        </p:txBody>
+      </p:sp>
+      <p:sp>
+        <p:nvSpPr>
+          <p:cNvPr id="6" name="Espaço Reservado para Conteúdo 5"/>
+          <p:cNvSpPr>
+            <a:spLocks noGrp="1"/>
+          </p:cNvSpPr>
+          <p:nvPr>
+            <p:ph idx="1"/>
+          </p:nvPr>
+        </p:nvSpPr>
+        <p:spPr/>
+        <p:txBody>
+          <a:bodyPr>
+            <a:normAutofit/>
+          </a:bodyPr>
+          <a:lstStyle/>
+          <a:p>
+            <a:r>
+              <a:rPr lang="en-US" dirty="0" err="1"/>
+              <a:t>Digite</a:t>
+            </a:r>
+            <a:r>
+              <a:rPr lang="en-US" dirty="0"/>
+              <a:t> </a:t>
+            </a:r>
+            <a:r>
+              <a:rPr lang="en-US" b="1" dirty="0" err="1">
+                <a:latin typeface="Courier New" panose="02070309020205020404" pitchFamily="49" charset="0"/>
+                <a:cs typeface="Courier New" panose="02070309020205020404" pitchFamily="49" charset="0"/>
+              </a:rPr>
+              <a:t>firstName</a:t>
+            </a:r>
+            <a:r>
+              <a:rPr lang="en-US" dirty="0"/>
+              <a:t> no campo de entrada e finalize o </a:t>
+            </a:r>
+            <a:r>
+              <a:rPr lang="en-US" dirty="0" err="1"/>
+              <a:t>comando</a:t>
+            </a:r>
+            <a:r>
+              <a:rPr lang="en-US" dirty="0"/>
+              <a:t> com </a:t>
+            </a:r>
+            <a:r>
+              <a:rPr lang="en-US" dirty="0" err="1"/>
+              <a:t>ponto</a:t>
+            </a:r>
+            <a:r>
+              <a:rPr lang="en-US" dirty="0"/>
+              <a:t> e </a:t>
+            </a:r>
+            <a:r>
+              <a:rPr lang="en-US" dirty="0" err="1"/>
+              <a:t>vírgula</a:t>
+            </a:r>
+            <a:r>
+              <a:rPr lang="en-US" dirty="0"/>
+              <a:t>. </a:t>
+            </a:r>
+            <a:r>
+              <a:rPr lang="en-US" dirty="0" err="1"/>
+              <a:t>Depois</a:t>
+            </a:r>
+            <a:r>
+              <a:rPr lang="en-US" dirty="0"/>
+              <a:t> </a:t>
+            </a:r>
+            <a:r>
+              <a:rPr lang="en-US" dirty="0" err="1"/>
+              <a:t>pressione</a:t>
+            </a:r>
+            <a:r>
+              <a:rPr lang="en-US" dirty="0"/>
+              <a:t> </a:t>
+            </a:r>
+            <a:r>
+              <a:rPr lang="en-US" b="1" dirty="0">
+                <a:latin typeface="Courier New" panose="02070309020205020404" pitchFamily="49" charset="0"/>
+                <a:cs typeface="Courier New" panose="02070309020205020404" pitchFamily="49" charset="0"/>
+              </a:rPr>
+              <a:t>Enter</a:t>
+            </a:r>
+            <a:r>
+              <a:rPr lang="en-US" dirty="0"/>
+              <a:t>.</a:t>
+            </a:r>
+            <a:endParaRPr lang="pt-BR" dirty="0"/>
+          </a:p>
+        </p:txBody>
+      </p:sp>
+      <p:pic>
+        <p:nvPicPr>
+          <p:cNvPr id="2" name="Picture 1">
+            <a:extLst>
+              <a:ext uri="{FF2B5EF4-FFF2-40B4-BE49-F238E27FC236}">
+                <a16:creationId xmlns:a16="http://schemas.microsoft.com/office/drawing/2014/main" id="{63EEF077-8F90-4149-A101-53E7A55400F4}"/>
+              </a:ext>
+            </a:extLst>
+          </p:cNvPr>
+          <p:cNvPicPr>
+            <a:picLocks noChangeAspect="1"/>
+          </p:cNvPicPr>
+          <p:nvPr/>
+        </p:nvPicPr>
+        <p:blipFill>
+          <a:blip r:embed="rId3"/>
+          <a:stretch>
+            <a:fillRect/>
+          </a:stretch>
+        </p:blipFill>
+        <p:spPr>
+          <a:xfrm>
+            <a:off x="1976438" y="2927766"/>
+            <a:ext cx="8239125" cy="2714625"/>
+          </a:xfrm>
+          <a:prstGeom prst="rect">
+            <a:avLst/>
+          </a:prstGeom>
+        </p:spPr>
+      </p:pic>
+    </p:spTree>
+    <p:extLst>
+      <p:ext uri="{BB962C8B-B14F-4D97-AF65-F5344CB8AC3E}">
+        <p14:creationId xmlns:p14="http://schemas.microsoft.com/office/powerpoint/2010/main" val="3995047979"/>
+      </p:ext>
+    </p:extLst>
+  </p:cSld>
+  <p:clrMapOvr>
+    <a:masterClrMapping/>
+  </p:clrMapOvr>
+</p:sld>
+</file>
+
+<file path=ppt/slides/slide18.xml><?xml version="1.0" encoding="utf-8"?>
+<p:sld xmlns:a="http://schemas.openxmlformats.org/drawingml/2006/main" xmlns:r="http://schemas.openxmlformats.org/officeDocument/2006/relationships" xmlns:p="http://schemas.openxmlformats.org/presentationml/2006/main">
+  <p:cSld>
+    <p:spTree>
+      <p:nvGrpSpPr>
+        <p:cNvPr id="1" name=""/>
+        <p:cNvGrpSpPr/>
+        <p:nvPr/>
+      </p:nvGrpSpPr>
+      <p:grpSpPr>
+        <a:xfrm>
+          <a:off x="0" y="0"/>
+          <a:ext cx="0" cy="0"/>
+          <a:chOff x="0" y="0"/>
+          <a:chExt cx="0" cy="0"/>
+        </a:xfrm>
+      </p:grpSpPr>
+      <p:sp>
+        <p:nvSpPr>
+          <p:cNvPr id="5" name="Título 4"/>
+          <p:cNvSpPr>
+            <a:spLocks noGrp="1"/>
+          </p:cNvSpPr>
+          <p:nvPr>
+            <p:ph type="title"/>
+          </p:nvPr>
+        </p:nvSpPr>
+        <p:spPr/>
+        <p:txBody>
+          <a:bodyPr/>
+          <a:lstStyle/>
+          <a:p>
+            <a:r>
+              <a:rPr lang="pt-BR" dirty="0"/>
+              <a:t>JavaScript.com - 06</a:t>
+            </a:r>
+          </a:p>
+        </p:txBody>
+      </p:sp>
+      <p:sp>
+        <p:nvSpPr>
+          <p:cNvPr id="6" name="Espaço Reservado para Conteúdo 5"/>
+          <p:cNvSpPr>
+            <a:spLocks noGrp="1"/>
+          </p:cNvSpPr>
+          <p:nvPr>
+            <p:ph idx="1"/>
+          </p:nvPr>
+        </p:nvSpPr>
+        <p:spPr/>
+        <p:txBody>
+          <a:bodyPr>
+            <a:normAutofit/>
+          </a:bodyPr>
+          <a:lstStyle/>
+          <a:p>
+            <a:r>
+              <a:rPr lang="pt-BR" dirty="0"/>
+              <a:t>Também podemos trabalhar com números e passa-los como parâmetros.</a:t>
+            </a:r>
+          </a:p>
+          <a:p>
+            <a:r>
+              <a:rPr lang="pt-BR" dirty="0"/>
+              <a:t>Diferentemente de </a:t>
+            </a:r>
+            <a:r>
+              <a:rPr lang="pt-BR" dirty="0" err="1"/>
+              <a:t>strings</a:t>
+            </a:r>
+            <a:r>
+              <a:rPr lang="pt-BR" dirty="0"/>
+              <a:t>, os número não precisam ser envolvidos por aspas.</a:t>
+            </a:r>
+          </a:p>
+        </p:txBody>
+      </p:sp>
+    </p:spTree>
+    <p:extLst>
+      <p:ext uri="{BB962C8B-B14F-4D97-AF65-F5344CB8AC3E}">
+        <p14:creationId xmlns:p14="http://schemas.microsoft.com/office/powerpoint/2010/main" val="3300841092"/>
+      </p:ext>
+    </p:extLst>
+  </p:cSld>
+  <p:clrMapOvr>
+    <a:masterClrMapping/>
+  </p:clrMapOvr>
+</p:sld>
+</file>
+
+<file path=ppt/slides/slide19.xml><?xml version="1.0" encoding="utf-8"?>
+<p:sld xmlns:a="http://schemas.openxmlformats.org/drawingml/2006/main" xmlns:r="http://schemas.openxmlformats.org/officeDocument/2006/relationships" xmlns:p="http://schemas.openxmlformats.org/presentationml/2006/main">
+  <p:cSld>
+    <p:spTree>
+      <p:nvGrpSpPr>
+        <p:cNvPr id="1" name=""/>
+        <p:cNvGrpSpPr/>
+        <p:nvPr/>
+      </p:nvGrpSpPr>
+      <p:grpSpPr>
+        <a:xfrm>
+          <a:off x="0" y="0"/>
+          <a:ext cx="0" cy="0"/>
+          <a:chOff x="0" y="0"/>
+          <a:chExt cx="0" cy="0"/>
+        </a:xfrm>
+      </p:grpSpPr>
+      <p:sp>
+        <p:nvSpPr>
+          <p:cNvPr id="5" name="Título 4"/>
+          <p:cNvSpPr>
+            <a:spLocks noGrp="1"/>
+          </p:cNvSpPr>
+          <p:nvPr>
+            <p:ph type="title"/>
+          </p:nvPr>
+        </p:nvSpPr>
+        <p:spPr/>
+        <p:txBody>
+          <a:bodyPr/>
+          <a:lstStyle/>
+          <a:p>
+            <a:r>
+              <a:rPr lang="pt-BR" dirty="0"/>
+              <a:t>JavaScript.com - 06</a:t>
+            </a:r>
+          </a:p>
+        </p:txBody>
+      </p:sp>
+      <p:sp>
+        <p:nvSpPr>
+          <p:cNvPr id="6" name="Espaço Reservado para Conteúdo 5"/>
+          <p:cNvSpPr>
+            <a:spLocks noGrp="1"/>
+          </p:cNvSpPr>
+          <p:nvPr>
+            <p:ph idx="1"/>
+          </p:nvPr>
+        </p:nvSpPr>
+        <p:spPr/>
+        <p:txBody>
+          <a:bodyPr>
+            <a:normAutofit/>
+          </a:bodyPr>
+          <a:lstStyle/>
+          <a:p>
+            <a:r>
+              <a:rPr lang="en-US" dirty="0" err="1"/>
+              <a:t>Digite</a:t>
+            </a:r>
+            <a:r>
+              <a:rPr lang="en-US" dirty="0"/>
+              <a:t> </a:t>
+            </a:r>
+            <a:r>
+              <a:rPr lang="en-US" b="1" dirty="0">
+                <a:latin typeface="Courier New" panose="02070309020205020404" pitchFamily="49" charset="0"/>
+                <a:cs typeface="Courier New" panose="02070309020205020404" pitchFamily="49" charset="0"/>
+              </a:rPr>
+              <a:t>alert(42)</a:t>
+            </a:r>
+            <a:r>
+              <a:rPr lang="en-US" dirty="0"/>
+              <a:t> no campo de entrada e finalize o </a:t>
+            </a:r>
+            <a:r>
+              <a:rPr lang="en-US" dirty="0" err="1"/>
+              <a:t>comando</a:t>
+            </a:r>
+            <a:r>
+              <a:rPr lang="en-US" dirty="0"/>
+              <a:t> com </a:t>
+            </a:r>
+            <a:r>
+              <a:rPr lang="en-US" dirty="0" err="1"/>
+              <a:t>ponto</a:t>
+            </a:r>
+            <a:r>
+              <a:rPr lang="en-US" dirty="0"/>
+              <a:t> e </a:t>
+            </a:r>
+            <a:r>
+              <a:rPr lang="en-US" dirty="0" err="1"/>
+              <a:t>vírgula</a:t>
+            </a:r>
+            <a:r>
+              <a:rPr lang="en-US" dirty="0"/>
+              <a:t>. </a:t>
+            </a:r>
+            <a:r>
+              <a:rPr lang="en-US" dirty="0" err="1"/>
+              <a:t>Depois</a:t>
+            </a:r>
+            <a:r>
+              <a:rPr lang="en-US" dirty="0"/>
+              <a:t> </a:t>
+            </a:r>
+            <a:r>
+              <a:rPr lang="en-US" dirty="0" err="1"/>
+              <a:t>pressione</a:t>
+            </a:r>
+            <a:r>
+              <a:rPr lang="en-US" dirty="0"/>
+              <a:t> </a:t>
+            </a:r>
+            <a:r>
+              <a:rPr lang="en-US" b="1" dirty="0">
+                <a:latin typeface="Courier New" panose="02070309020205020404" pitchFamily="49" charset="0"/>
+                <a:cs typeface="Courier New" panose="02070309020205020404" pitchFamily="49" charset="0"/>
+              </a:rPr>
+              <a:t>Enter</a:t>
+            </a:r>
+            <a:r>
+              <a:rPr lang="en-US" dirty="0"/>
+              <a:t>.</a:t>
+            </a:r>
+            <a:endParaRPr lang="pt-BR" dirty="0"/>
+          </a:p>
+        </p:txBody>
+      </p:sp>
+      <p:pic>
+        <p:nvPicPr>
+          <p:cNvPr id="3" name="Picture 2">
+            <a:extLst>
+              <a:ext uri="{FF2B5EF4-FFF2-40B4-BE49-F238E27FC236}">
+                <a16:creationId xmlns:a16="http://schemas.microsoft.com/office/drawing/2014/main" id="{AA5000F8-29F6-44C0-8D1F-810AD01E0493}"/>
+              </a:ext>
+            </a:extLst>
+          </p:cNvPr>
+          <p:cNvPicPr>
+            <a:picLocks noChangeAspect="1"/>
+          </p:cNvPicPr>
+          <p:nvPr/>
+        </p:nvPicPr>
+        <p:blipFill>
+          <a:blip r:embed="rId3"/>
+          <a:stretch>
+            <a:fillRect/>
+          </a:stretch>
+        </p:blipFill>
+        <p:spPr>
+          <a:xfrm>
+            <a:off x="1895475" y="2755967"/>
+            <a:ext cx="8401050" cy="3028950"/>
+          </a:xfrm>
+          <a:prstGeom prst="rect">
+            <a:avLst/>
+          </a:prstGeom>
+        </p:spPr>
+      </p:pic>
+    </p:spTree>
+    <p:extLst>
+      <p:ext uri="{BB962C8B-B14F-4D97-AF65-F5344CB8AC3E}">
+        <p14:creationId xmlns:p14="http://schemas.microsoft.com/office/powerpoint/2010/main" val="1283535456"/>
       </p:ext>
     </p:extLst>
   </p:cSld>
@@ -5139,6 +7226,707 @@
     <p:extLst>
       <p:ext uri="{BB962C8B-B14F-4D97-AF65-F5344CB8AC3E}">
         <p14:creationId xmlns:p14="http://schemas.microsoft.com/office/powerpoint/2010/main" val="205696864"/>
+      </p:ext>
+    </p:extLst>
+  </p:cSld>
+  <p:clrMapOvr>
+    <a:masterClrMapping/>
+  </p:clrMapOvr>
+</p:sld>
+</file>
+
+<file path=ppt/slides/slide20.xml><?xml version="1.0" encoding="utf-8"?>
+<p:sld xmlns:a="http://schemas.openxmlformats.org/drawingml/2006/main" xmlns:r="http://schemas.openxmlformats.org/officeDocument/2006/relationships" xmlns:p="http://schemas.openxmlformats.org/presentationml/2006/main">
+  <p:cSld>
+    <p:spTree>
+      <p:nvGrpSpPr>
+        <p:cNvPr id="1" name=""/>
+        <p:cNvGrpSpPr/>
+        <p:nvPr/>
+      </p:nvGrpSpPr>
+      <p:grpSpPr>
+        <a:xfrm>
+          <a:off x="0" y="0"/>
+          <a:ext cx="0" cy="0"/>
+          <a:chOff x="0" y="0"/>
+          <a:chExt cx="0" cy="0"/>
+        </a:xfrm>
+      </p:grpSpPr>
+      <p:sp>
+        <p:nvSpPr>
+          <p:cNvPr id="5" name="Título 4"/>
+          <p:cNvSpPr>
+            <a:spLocks noGrp="1"/>
+          </p:cNvSpPr>
+          <p:nvPr>
+            <p:ph type="title"/>
+          </p:nvPr>
+        </p:nvSpPr>
+        <p:spPr/>
+        <p:txBody>
+          <a:bodyPr/>
+          <a:lstStyle/>
+          <a:p>
+            <a:r>
+              <a:rPr lang="pt-BR" dirty="0"/>
+              <a:t>JavaScript.com - 07</a:t>
+            </a:r>
+          </a:p>
+        </p:txBody>
+      </p:sp>
+      <p:sp>
+        <p:nvSpPr>
+          <p:cNvPr id="6" name="Espaço Reservado para Conteúdo 5"/>
+          <p:cNvSpPr>
+            <a:spLocks noGrp="1"/>
+          </p:cNvSpPr>
+          <p:nvPr>
+            <p:ph idx="1"/>
+          </p:nvPr>
+        </p:nvSpPr>
+        <p:spPr/>
+        <p:txBody>
+          <a:bodyPr>
+            <a:normAutofit/>
+          </a:bodyPr>
+          <a:lstStyle/>
+          <a:p>
+            <a:r>
+              <a:rPr lang="pt-BR" dirty="0"/>
+              <a:t>Realizar operações matemáticas é bem intuitivo. Os operadores básicos são:</a:t>
+            </a:r>
+          </a:p>
+          <a:p>
+            <a:pPr marL="457200" indent="-457200" algn="l">
+              <a:buFont typeface="Arial" panose="020B0604020202020204" pitchFamily="34" charset="0"/>
+              <a:buChar char="•"/>
+            </a:pPr>
+            <a:r>
+              <a:rPr lang="pt-BR" dirty="0"/>
+              <a:t>Adição: +;</a:t>
+            </a:r>
+          </a:p>
+          <a:p>
+            <a:pPr marL="457200" indent="-457200" algn="l">
+              <a:buFont typeface="Arial" panose="020B0604020202020204" pitchFamily="34" charset="0"/>
+              <a:buChar char="•"/>
+            </a:pPr>
+            <a:r>
+              <a:rPr lang="pt-BR" dirty="0"/>
+              <a:t>Subtração: -;</a:t>
+            </a:r>
+          </a:p>
+          <a:p>
+            <a:pPr marL="457200" indent="-457200" algn="l">
+              <a:buFont typeface="Arial" panose="020B0604020202020204" pitchFamily="34" charset="0"/>
+              <a:buChar char="•"/>
+            </a:pPr>
+            <a:r>
+              <a:rPr lang="pt-BR" dirty="0"/>
+              <a:t>Multiplicação: *; e</a:t>
+            </a:r>
+          </a:p>
+          <a:p>
+            <a:pPr marL="457200" indent="-457200" algn="l">
+              <a:buFont typeface="Arial" panose="020B0604020202020204" pitchFamily="34" charset="0"/>
+              <a:buChar char="•"/>
+            </a:pPr>
+            <a:r>
+              <a:rPr lang="pt-BR" dirty="0"/>
+              <a:t>Divisão: /.</a:t>
+            </a:r>
+          </a:p>
+        </p:txBody>
+      </p:sp>
+    </p:spTree>
+    <p:extLst>
+      <p:ext uri="{BB962C8B-B14F-4D97-AF65-F5344CB8AC3E}">
+        <p14:creationId xmlns:p14="http://schemas.microsoft.com/office/powerpoint/2010/main" val="2592750476"/>
+      </p:ext>
+    </p:extLst>
+  </p:cSld>
+  <p:clrMapOvr>
+    <a:masterClrMapping/>
+  </p:clrMapOvr>
+</p:sld>
+</file>
+
+<file path=ppt/slides/slide21.xml><?xml version="1.0" encoding="utf-8"?>
+<p:sld xmlns:a="http://schemas.openxmlformats.org/drawingml/2006/main" xmlns:r="http://schemas.openxmlformats.org/officeDocument/2006/relationships" xmlns:p="http://schemas.openxmlformats.org/presentationml/2006/main">
+  <p:cSld>
+    <p:spTree>
+      <p:nvGrpSpPr>
+        <p:cNvPr id="1" name=""/>
+        <p:cNvGrpSpPr/>
+        <p:nvPr/>
+      </p:nvGrpSpPr>
+      <p:grpSpPr>
+        <a:xfrm>
+          <a:off x="0" y="0"/>
+          <a:ext cx="0" cy="0"/>
+          <a:chOff x="0" y="0"/>
+          <a:chExt cx="0" cy="0"/>
+        </a:xfrm>
+      </p:grpSpPr>
+      <p:sp>
+        <p:nvSpPr>
+          <p:cNvPr id="5" name="Título 4"/>
+          <p:cNvSpPr>
+            <a:spLocks noGrp="1"/>
+          </p:cNvSpPr>
+          <p:nvPr>
+            <p:ph type="title"/>
+          </p:nvPr>
+        </p:nvSpPr>
+        <p:spPr/>
+        <p:txBody>
+          <a:bodyPr/>
+          <a:lstStyle/>
+          <a:p>
+            <a:r>
+              <a:rPr lang="pt-BR" dirty="0"/>
+              <a:t>JavaScript.com - 07</a:t>
+            </a:r>
+          </a:p>
+        </p:txBody>
+      </p:sp>
+      <p:sp>
+        <p:nvSpPr>
+          <p:cNvPr id="6" name="Espaço Reservado para Conteúdo 5"/>
+          <p:cNvSpPr>
+            <a:spLocks noGrp="1"/>
+          </p:cNvSpPr>
+          <p:nvPr>
+            <p:ph idx="1"/>
+          </p:nvPr>
+        </p:nvSpPr>
+        <p:spPr/>
+        <p:txBody>
+          <a:bodyPr>
+            <a:normAutofit/>
+          </a:bodyPr>
+          <a:lstStyle/>
+          <a:p>
+            <a:r>
+              <a:rPr lang="en-US" dirty="0" err="1"/>
+              <a:t>Digite</a:t>
+            </a:r>
+            <a:r>
+              <a:rPr lang="en-US" dirty="0"/>
+              <a:t> </a:t>
+            </a:r>
+            <a:r>
+              <a:rPr lang="en-US" b="1" dirty="0">
+                <a:latin typeface="Courier New" panose="02070309020205020404" pitchFamily="49" charset="0"/>
+                <a:cs typeface="Courier New" panose="02070309020205020404" pitchFamily="49" charset="0"/>
+              </a:rPr>
+              <a:t>14 + 28</a:t>
+            </a:r>
+            <a:r>
+              <a:rPr lang="en-US" dirty="0"/>
+              <a:t> no campo de entrada e finalize o </a:t>
+            </a:r>
+            <a:r>
+              <a:rPr lang="en-US" dirty="0" err="1"/>
+              <a:t>comando</a:t>
+            </a:r>
+            <a:r>
+              <a:rPr lang="en-US" dirty="0"/>
+              <a:t> com </a:t>
+            </a:r>
+            <a:r>
+              <a:rPr lang="en-US" dirty="0" err="1"/>
+              <a:t>ponto</a:t>
+            </a:r>
+            <a:r>
+              <a:rPr lang="en-US" dirty="0"/>
+              <a:t> e </a:t>
+            </a:r>
+            <a:r>
+              <a:rPr lang="en-US" dirty="0" err="1"/>
+              <a:t>vírgula</a:t>
+            </a:r>
+            <a:r>
+              <a:rPr lang="en-US" dirty="0"/>
+              <a:t>. </a:t>
+            </a:r>
+            <a:r>
+              <a:rPr lang="en-US" dirty="0" err="1"/>
+              <a:t>Depois</a:t>
+            </a:r>
+            <a:r>
+              <a:rPr lang="en-US" dirty="0"/>
+              <a:t> </a:t>
+            </a:r>
+            <a:r>
+              <a:rPr lang="en-US" dirty="0" err="1"/>
+              <a:t>pressione</a:t>
+            </a:r>
+            <a:r>
+              <a:rPr lang="en-US" dirty="0"/>
+              <a:t> </a:t>
+            </a:r>
+            <a:r>
+              <a:rPr lang="en-US" b="1" dirty="0">
+                <a:latin typeface="Courier New" panose="02070309020205020404" pitchFamily="49" charset="0"/>
+                <a:cs typeface="Courier New" panose="02070309020205020404" pitchFamily="49" charset="0"/>
+              </a:rPr>
+              <a:t>Enter</a:t>
+            </a:r>
+            <a:r>
+              <a:rPr lang="en-US" dirty="0"/>
+              <a:t>.</a:t>
+            </a:r>
+            <a:endParaRPr lang="pt-BR" dirty="0"/>
+          </a:p>
+        </p:txBody>
+      </p:sp>
+      <p:pic>
+        <p:nvPicPr>
+          <p:cNvPr id="2" name="Picture 1">
+            <a:extLst>
+              <a:ext uri="{FF2B5EF4-FFF2-40B4-BE49-F238E27FC236}">
+                <a16:creationId xmlns:a16="http://schemas.microsoft.com/office/drawing/2014/main" id="{8136CC32-1C4B-4E9A-B1ED-5E5B3FF51888}"/>
+              </a:ext>
+            </a:extLst>
+          </p:cNvPr>
+          <p:cNvPicPr>
+            <a:picLocks noChangeAspect="1"/>
+          </p:cNvPicPr>
+          <p:nvPr/>
+        </p:nvPicPr>
+        <p:blipFill>
+          <a:blip r:embed="rId3"/>
+          <a:stretch>
+            <a:fillRect/>
+          </a:stretch>
+        </p:blipFill>
+        <p:spPr>
+          <a:xfrm>
+            <a:off x="3333750" y="2967983"/>
+            <a:ext cx="5524500" cy="2419350"/>
+          </a:xfrm>
+          <a:prstGeom prst="rect">
+            <a:avLst/>
+          </a:prstGeom>
+        </p:spPr>
+      </p:pic>
+    </p:spTree>
+    <p:extLst>
+      <p:ext uri="{BB962C8B-B14F-4D97-AF65-F5344CB8AC3E}">
+        <p14:creationId xmlns:p14="http://schemas.microsoft.com/office/powerpoint/2010/main" val="2952538530"/>
+      </p:ext>
+    </p:extLst>
+  </p:cSld>
+  <p:clrMapOvr>
+    <a:masterClrMapping/>
+  </p:clrMapOvr>
+</p:sld>
+</file>
+
+<file path=ppt/slides/slide22.xml><?xml version="1.0" encoding="utf-8"?>
+<p:sld xmlns:a="http://schemas.openxmlformats.org/drawingml/2006/main" xmlns:r="http://schemas.openxmlformats.org/officeDocument/2006/relationships" xmlns:p="http://schemas.openxmlformats.org/presentationml/2006/main">
+  <p:cSld>
+    <p:spTree>
+      <p:nvGrpSpPr>
+        <p:cNvPr id="1" name=""/>
+        <p:cNvGrpSpPr/>
+        <p:nvPr/>
+      </p:nvGrpSpPr>
+      <p:grpSpPr>
+        <a:xfrm>
+          <a:off x="0" y="0"/>
+          <a:ext cx="0" cy="0"/>
+          <a:chOff x="0" y="0"/>
+          <a:chExt cx="0" cy="0"/>
+        </a:xfrm>
+      </p:grpSpPr>
+      <p:sp>
+        <p:nvSpPr>
+          <p:cNvPr id="5" name="Título 4"/>
+          <p:cNvSpPr>
+            <a:spLocks noGrp="1"/>
+          </p:cNvSpPr>
+          <p:nvPr>
+            <p:ph type="title"/>
+          </p:nvPr>
+        </p:nvSpPr>
+        <p:spPr/>
+        <p:txBody>
+          <a:bodyPr/>
+          <a:lstStyle/>
+          <a:p>
+            <a:r>
+              <a:rPr lang="pt-BR" dirty="0"/>
+              <a:t>JavaScript.com - 08</a:t>
+            </a:r>
+          </a:p>
+        </p:txBody>
+      </p:sp>
+      <p:sp>
+        <p:nvSpPr>
+          <p:cNvPr id="6" name="Espaço Reservado para Conteúdo 5"/>
+          <p:cNvSpPr>
+            <a:spLocks noGrp="1"/>
+          </p:cNvSpPr>
+          <p:nvPr>
+            <p:ph idx="1"/>
+          </p:nvPr>
+        </p:nvSpPr>
+        <p:spPr/>
+        <p:txBody>
+          <a:bodyPr>
+            <a:normAutofit/>
+          </a:bodyPr>
+          <a:lstStyle/>
+          <a:p>
+            <a:r>
+              <a:rPr lang="pt-BR" dirty="0"/>
+              <a:t>Também podemos adicionar </a:t>
+            </a:r>
+            <a:r>
+              <a:rPr lang="pt-BR" dirty="0" err="1"/>
+              <a:t>strings</a:t>
+            </a:r>
+            <a:r>
+              <a:rPr lang="pt-BR" dirty="0"/>
+              <a:t>!</a:t>
+            </a:r>
+          </a:p>
+          <a:p>
+            <a:r>
+              <a:rPr lang="pt-BR" dirty="0"/>
+              <a:t>Mas adicionar dados desse tipo gera uma concatenação das </a:t>
+            </a:r>
+            <a:r>
+              <a:rPr lang="pt-BR" dirty="0" err="1"/>
+              <a:t>strings</a:t>
+            </a:r>
+            <a:r>
+              <a:rPr lang="pt-BR" dirty="0"/>
+              <a:t>.</a:t>
+            </a:r>
+          </a:p>
+          <a:p>
+            <a:r>
+              <a:rPr lang="pt-BR" dirty="0"/>
+              <a:t>Crie uma mensagem que concatena seu nome e uma outra </a:t>
+            </a:r>
+            <a:r>
+              <a:rPr lang="pt-BR" dirty="0" err="1"/>
+              <a:t>string</a:t>
+            </a:r>
+            <a:endParaRPr lang="pt-BR" dirty="0"/>
+          </a:p>
+        </p:txBody>
+      </p:sp>
+    </p:spTree>
+    <p:extLst>
+      <p:ext uri="{BB962C8B-B14F-4D97-AF65-F5344CB8AC3E}">
+        <p14:creationId xmlns:p14="http://schemas.microsoft.com/office/powerpoint/2010/main" val="3632393438"/>
+      </p:ext>
+    </p:extLst>
+  </p:cSld>
+  <p:clrMapOvr>
+    <a:masterClrMapping/>
+  </p:clrMapOvr>
+</p:sld>
+</file>
+
+<file path=ppt/slides/slide23.xml><?xml version="1.0" encoding="utf-8"?>
+<p:sld xmlns:a="http://schemas.openxmlformats.org/drawingml/2006/main" xmlns:r="http://schemas.openxmlformats.org/officeDocument/2006/relationships" xmlns:p="http://schemas.openxmlformats.org/presentationml/2006/main">
+  <p:cSld>
+    <p:spTree>
+      <p:nvGrpSpPr>
+        <p:cNvPr id="1" name=""/>
+        <p:cNvGrpSpPr/>
+        <p:nvPr/>
+      </p:nvGrpSpPr>
+      <p:grpSpPr>
+        <a:xfrm>
+          <a:off x="0" y="0"/>
+          <a:ext cx="0" cy="0"/>
+          <a:chOff x="0" y="0"/>
+          <a:chExt cx="0" cy="0"/>
+        </a:xfrm>
+      </p:grpSpPr>
+      <p:sp>
+        <p:nvSpPr>
+          <p:cNvPr id="5" name="Título 4"/>
+          <p:cNvSpPr>
+            <a:spLocks noGrp="1"/>
+          </p:cNvSpPr>
+          <p:nvPr>
+            <p:ph type="title"/>
+          </p:nvPr>
+        </p:nvSpPr>
+        <p:spPr/>
+        <p:txBody>
+          <a:bodyPr/>
+          <a:lstStyle/>
+          <a:p>
+            <a:r>
+              <a:rPr lang="pt-BR" dirty="0"/>
+              <a:t>JavaScript.com - 08</a:t>
+            </a:r>
+          </a:p>
+        </p:txBody>
+      </p:sp>
+      <p:sp>
+        <p:nvSpPr>
+          <p:cNvPr id="6" name="Espaço Reservado para Conteúdo 5"/>
+          <p:cNvSpPr>
+            <a:spLocks noGrp="1"/>
+          </p:cNvSpPr>
+          <p:nvPr>
+            <p:ph idx="1"/>
+          </p:nvPr>
+        </p:nvSpPr>
+        <p:spPr/>
+        <p:txBody>
+          <a:bodyPr>
+            <a:normAutofit/>
+          </a:bodyPr>
+          <a:lstStyle/>
+          <a:p>
+            <a:r>
+              <a:rPr lang="en-US" dirty="0" err="1"/>
+              <a:t>Digite</a:t>
+            </a:r>
+            <a:r>
+              <a:rPr lang="en-US" dirty="0"/>
+              <a:t> </a:t>
+            </a:r>
+            <a:r>
+              <a:rPr lang="en-US" b="1" dirty="0">
+                <a:latin typeface="Courier New" panose="02070309020205020404" pitchFamily="49" charset="0"/>
+                <a:cs typeface="Courier New" panose="02070309020205020404" pitchFamily="49" charset="0"/>
+              </a:rPr>
+              <a:t>alert(</a:t>
+            </a:r>
+            <a:r>
+              <a:rPr lang="en-US" b="1" dirty="0" err="1">
+                <a:latin typeface="Courier New" panose="02070309020205020404" pitchFamily="49" charset="0"/>
+                <a:cs typeface="Courier New" panose="02070309020205020404" pitchFamily="49" charset="0"/>
+              </a:rPr>
+              <a:t>firstName</a:t>
+            </a:r>
+            <a:r>
+              <a:rPr lang="en-US" b="1" dirty="0">
+                <a:latin typeface="Courier New" panose="02070309020205020404" pitchFamily="49" charset="0"/>
+                <a:cs typeface="Courier New" panose="02070309020205020404" pitchFamily="49" charset="0"/>
+              </a:rPr>
+              <a:t> + “ is awesome!”)</a:t>
+            </a:r>
+            <a:r>
+              <a:rPr lang="en-US" dirty="0"/>
+              <a:t> no campo de entrada e finalize o </a:t>
+            </a:r>
+            <a:r>
+              <a:rPr lang="en-US" dirty="0" err="1"/>
+              <a:t>comando</a:t>
+            </a:r>
+            <a:r>
+              <a:rPr lang="en-US" dirty="0"/>
+              <a:t> com </a:t>
+            </a:r>
+            <a:r>
+              <a:rPr lang="en-US" dirty="0" err="1"/>
+              <a:t>ponto</a:t>
+            </a:r>
+            <a:r>
+              <a:rPr lang="en-US" dirty="0"/>
+              <a:t> e </a:t>
+            </a:r>
+            <a:r>
+              <a:rPr lang="en-US" dirty="0" err="1"/>
+              <a:t>vírgula</a:t>
+            </a:r>
+            <a:r>
+              <a:rPr lang="en-US" dirty="0"/>
+              <a:t>. </a:t>
+            </a:r>
+            <a:r>
+              <a:rPr lang="en-US" dirty="0" err="1"/>
+              <a:t>Depois</a:t>
+            </a:r>
+            <a:r>
+              <a:rPr lang="en-US" dirty="0"/>
+              <a:t> </a:t>
+            </a:r>
+            <a:r>
+              <a:rPr lang="en-US" dirty="0" err="1"/>
+              <a:t>pressione</a:t>
+            </a:r>
+            <a:r>
+              <a:rPr lang="en-US" dirty="0"/>
+              <a:t> </a:t>
+            </a:r>
+            <a:r>
+              <a:rPr lang="en-US" b="1" dirty="0">
+                <a:latin typeface="Courier New" panose="02070309020205020404" pitchFamily="49" charset="0"/>
+                <a:cs typeface="Courier New" panose="02070309020205020404" pitchFamily="49" charset="0"/>
+              </a:rPr>
+              <a:t>Enter</a:t>
+            </a:r>
+            <a:r>
+              <a:rPr lang="en-US" dirty="0"/>
+              <a:t>.</a:t>
+            </a:r>
+            <a:endParaRPr lang="pt-BR" dirty="0"/>
+          </a:p>
+        </p:txBody>
+      </p:sp>
+      <p:pic>
+        <p:nvPicPr>
+          <p:cNvPr id="3" name="Picture 2">
+            <a:extLst>
+              <a:ext uri="{FF2B5EF4-FFF2-40B4-BE49-F238E27FC236}">
+                <a16:creationId xmlns:a16="http://schemas.microsoft.com/office/drawing/2014/main" id="{9ED4225E-87B5-4A02-8336-F61BAF5F7F15}"/>
+              </a:ext>
+            </a:extLst>
+          </p:cNvPr>
+          <p:cNvPicPr>
+            <a:picLocks noChangeAspect="1"/>
+          </p:cNvPicPr>
+          <p:nvPr/>
+        </p:nvPicPr>
+        <p:blipFill>
+          <a:blip r:embed="rId3"/>
+          <a:stretch>
+            <a:fillRect/>
+          </a:stretch>
+        </p:blipFill>
+        <p:spPr>
+          <a:xfrm>
+            <a:off x="2286000" y="2973681"/>
+            <a:ext cx="7620000" cy="2876550"/>
+          </a:xfrm>
+          <a:prstGeom prst="rect">
+            <a:avLst/>
+          </a:prstGeom>
+        </p:spPr>
+      </p:pic>
+    </p:spTree>
+    <p:extLst>
+      <p:ext uri="{BB962C8B-B14F-4D97-AF65-F5344CB8AC3E}">
+        <p14:creationId xmlns:p14="http://schemas.microsoft.com/office/powerpoint/2010/main" val="2432692160"/>
+      </p:ext>
+    </p:extLst>
+  </p:cSld>
+  <p:clrMapOvr>
+    <a:masterClrMapping/>
+  </p:clrMapOvr>
+</p:sld>
+</file>
+
+<file path=ppt/slides/slide24.xml><?xml version="1.0" encoding="utf-8"?>
+<p:sld xmlns:a="http://schemas.openxmlformats.org/drawingml/2006/main" xmlns:r="http://schemas.openxmlformats.org/officeDocument/2006/relationships" xmlns:p="http://schemas.openxmlformats.org/presentationml/2006/main">
+  <p:cSld>
+    <p:spTree>
+      <p:nvGrpSpPr>
+        <p:cNvPr id="1" name=""/>
+        <p:cNvGrpSpPr/>
+        <p:nvPr/>
+      </p:nvGrpSpPr>
+      <p:grpSpPr>
+        <a:xfrm>
+          <a:off x="0" y="0"/>
+          <a:ext cx="0" cy="0"/>
+          <a:chOff x="0" y="0"/>
+          <a:chExt cx="0" cy="0"/>
+        </a:xfrm>
+      </p:grpSpPr>
+      <p:sp>
+        <p:nvSpPr>
+          <p:cNvPr id="5" name="Título 4"/>
+          <p:cNvSpPr>
+            <a:spLocks noGrp="1"/>
+          </p:cNvSpPr>
+          <p:nvPr>
+            <p:ph type="title"/>
+          </p:nvPr>
+        </p:nvSpPr>
+        <p:spPr/>
+        <p:txBody>
+          <a:bodyPr>
+            <a:normAutofit/>
+          </a:bodyPr>
+          <a:lstStyle/>
+          <a:p>
+            <a:r>
+              <a:rPr lang="pt-BR" dirty="0"/>
+              <a:t>Referências</a:t>
+            </a:r>
+          </a:p>
+        </p:txBody>
+      </p:sp>
+      <p:sp>
+        <p:nvSpPr>
+          <p:cNvPr id="6" name="Espaço Reservado para Conteúdo 5"/>
+          <p:cNvSpPr>
+            <a:spLocks noGrp="1"/>
+          </p:cNvSpPr>
+          <p:nvPr>
+            <p:ph idx="1"/>
+          </p:nvPr>
+        </p:nvSpPr>
+        <p:spPr>
+          <a:xfrm>
+            <a:off x="317694" y="1291052"/>
+            <a:ext cx="11705493" cy="5011777"/>
+          </a:xfrm>
+        </p:spPr>
+        <p:txBody>
+          <a:bodyPr>
+            <a:normAutofit/>
+          </a:bodyPr>
+          <a:lstStyle/>
+          <a:p>
+            <a:r>
+              <a:rPr lang="pt-BR" dirty="0">
+                <a:hlinkClick r:id="rId3"/>
+              </a:rPr>
+              <a:t>https://www.devmedia.com.br/quem-quer-ser-um-programador-fullstack/38786</a:t>
+            </a:r>
+            <a:endParaRPr lang="pt-BR" dirty="0"/>
+          </a:p>
+          <a:p>
+            <a:r>
+              <a:rPr lang="en-US" dirty="0">
+                <a:hlinkClick r:id="rId4"/>
+              </a:rPr>
+              <a:t>https://www.w3schools.com/js/default.asp</a:t>
+            </a:r>
+            <a:endParaRPr lang="en-US" dirty="0"/>
+          </a:p>
+          <a:p>
+            <a:r>
+              <a:rPr lang="en-US" dirty="0">
+                <a:hlinkClick r:id="rId5"/>
+              </a:rPr>
+              <a:t>https://developer.mozilla.org/en-US/docs/Web/JavaScript</a:t>
+            </a:r>
+            <a:endParaRPr lang="en-US" dirty="0"/>
+          </a:p>
+          <a:p>
+            <a:r>
+              <a:rPr lang="en-US" dirty="0">
+                <a:hlinkClick r:id="rId6"/>
+              </a:rPr>
+              <a:t>https://universidadedatecnologia.com.br/o-que-e-linguagem-de-programacao/</a:t>
+            </a:r>
+            <a:endParaRPr lang="en-US" dirty="0"/>
+          </a:p>
+          <a:p>
+            <a:endParaRPr lang="pt-BR" dirty="0"/>
+          </a:p>
+        </p:txBody>
+      </p:sp>
+    </p:spTree>
+    <p:extLst>
+      <p:ext uri="{BB962C8B-B14F-4D97-AF65-F5344CB8AC3E}">
+        <p14:creationId xmlns:p14="http://schemas.microsoft.com/office/powerpoint/2010/main" val="2436293185"/>
       </p:ext>
     </p:extLst>
   </p:cSld>
@@ -5763,7 +8551,15 @@
             </a:r>
             <a:r>
               <a:rPr lang="en-US" dirty="0"/>
-              <a:t> commando com </a:t>
+              <a:t> </a:t>
+            </a:r>
+            <a:r>
+              <a:rPr lang="en-US" dirty="0" err="1"/>
+              <a:t>comando</a:t>
+            </a:r>
+            <a:r>
+              <a:rPr lang="en-US" dirty="0"/>
+              <a:t> com </a:t>
             </a:r>
             <a:r>
               <a:rPr lang="en-US" dirty="0" err="1"/>

</xml_diff>